<commit_message>
updated EPN diagram in presentation
</commit_message>
<xml_diff>
--- a/reports/Traffic Jam Preventer System.pptx
+++ b/reports/Traffic Jam Preventer System.pptx
@@ -9,7 +9,7 @@
     <p:sldId id="263" r:id="rId3"/>
     <p:sldId id="257" r:id="rId4"/>
     <p:sldId id="258" r:id="rId5"/>
-    <p:sldId id="259" r:id="rId6"/>
+    <p:sldId id="264" r:id="rId6"/>
     <p:sldId id="261" r:id="rId7"/>
     <p:sldId id="262" r:id="rId8"/>
     <p:sldId id="260" r:id="rId9"/>
@@ -842,7 +842,7 @@
             <a:fld id="{B61BEF0D-F0BB-DE4B-95CE-6DB70DBA9567}" type="datetimeFigureOut">
               <a:rPr lang="en-US" dirty="0"/>
               <a:pPr/>
-              <a:t>11/11/2016</a:t>
+              <a:t>11/12/2016</a:t>
             </a:fld>
             <a:endParaRPr lang="en-US" dirty="0"/>
           </a:p>
@@ -1090,7 +1090,7 @@
             <a:fld id="{B61BEF0D-F0BB-DE4B-95CE-6DB70DBA9567}" type="datetimeFigureOut">
               <a:rPr lang="en-US" dirty="0"/>
               <a:pPr/>
-              <a:t>11/11/2016</a:t>
+              <a:t>11/12/2016</a:t>
             </a:fld>
             <a:endParaRPr lang="en-US" dirty="0"/>
           </a:p>
@@ -1401,7 +1401,7 @@
             <a:fld id="{B61BEF0D-F0BB-DE4B-95CE-6DB70DBA9567}" type="datetimeFigureOut">
               <a:rPr lang="en-US" dirty="0"/>
               <a:pPr/>
-              <a:t>11/11/2016</a:t>
+              <a:t>11/12/2016</a:t>
             </a:fld>
             <a:endParaRPr lang="en-US" dirty="0"/>
           </a:p>
@@ -1739,7 +1739,7 @@
             <a:fld id="{B61BEF0D-F0BB-DE4B-95CE-6DB70DBA9567}" type="datetimeFigureOut">
               <a:rPr lang="en-US" dirty="0"/>
               <a:pPr/>
-              <a:t>11/11/2016</a:t>
+              <a:t>11/12/2016</a:t>
             </a:fld>
             <a:endParaRPr lang="en-US" dirty="0"/>
           </a:p>
@@ -2050,7 +2050,7 @@
             <a:fld id="{B61BEF0D-F0BB-DE4B-95CE-6DB70DBA9567}" type="datetimeFigureOut">
               <a:rPr lang="en-US" dirty="0"/>
               <a:pPr/>
-              <a:t>11/11/2016</a:t>
+              <a:t>11/12/2016</a:t>
             </a:fld>
             <a:endParaRPr lang="en-US" dirty="0"/>
           </a:p>
@@ -2440,7 +2440,7 @@
             <a:fld id="{B61BEF0D-F0BB-DE4B-95CE-6DB70DBA9567}" type="datetimeFigureOut">
               <a:rPr lang="en-US" dirty="0"/>
               <a:pPr/>
-              <a:t>11/11/2016</a:t>
+              <a:t>11/12/2016</a:t>
             </a:fld>
             <a:endParaRPr lang="en-US" dirty="0"/>
           </a:p>
@@ -2606,7 +2606,7 @@
           <a:p>
             <a:fld id="{55C6B4A9-1611-4792-9094-5F34BCA07E0B}" type="datetimeFigureOut">
               <a:rPr lang="en-US" dirty="0"/>
-              <a:t>11/11/2016</a:t>
+              <a:t>11/12/2016</a:t>
             </a:fld>
             <a:endParaRPr lang="en-US" dirty="0"/>
           </a:p>
@@ -2782,7 +2782,7 @@
             <a:fld id="{B61BEF0D-F0BB-DE4B-95CE-6DB70DBA9567}" type="datetimeFigureOut">
               <a:rPr lang="en-US" dirty="0"/>
               <a:pPr/>
-              <a:t>11/11/2016</a:t>
+              <a:t>11/12/2016</a:t>
             </a:fld>
             <a:endParaRPr lang="en-US" dirty="0"/>
           </a:p>
@@ -2955,7 +2955,7 @@
             <a:fld id="{B61BEF0D-F0BB-DE4B-95CE-6DB70DBA9567}" type="datetimeFigureOut">
               <a:rPr lang="en-US" dirty="0"/>
               <a:pPr/>
-              <a:t>11/11/2016</a:t>
+              <a:t>11/12/2016</a:t>
             </a:fld>
             <a:endParaRPr lang="en-US" dirty="0"/>
           </a:p>
@@ -3199,7 +3199,7 @@
             <a:fld id="{B61BEF0D-F0BB-DE4B-95CE-6DB70DBA9567}" type="datetimeFigureOut">
               <a:rPr lang="en-US" dirty="0"/>
               <a:pPr/>
-              <a:t>11/11/2016</a:t>
+              <a:t>11/12/2016</a:t>
             </a:fld>
             <a:endParaRPr lang="en-US" dirty="0"/>
           </a:p>
@@ -3427,7 +3427,7 @@
           <a:p>
             <a:fld id="{EB712588-04B1-427B-82EE-E8DB90309F08}" type="datetimeFigureOut">
               <a:rPr lang="en-US" dirty="0"/>
-              <a:t>11/11/2016</a:t>
+              <a:t>11/12/2016</a:t>
             </a:fld>
             <a:endParaRPr lang="en-US" dirty="0"/>
           </a:p>
@@ -3797,7 +3797,7 @@
             <a:fld id="{B61BEF0D-F0BB-DE4B-95CE-6DB70DBA9567}" type="datetimeFigureOut">
               <a:rPr lang="en-US" dirty="0"/>
               <a:pPr/>
-              <a:t>11/11/2016</a:t>
+              <a:t>11/12/2016</a:t>
             </a:fld>
             <a:endParaRPr lang="en-US" dirty="0"/>
           </a:p>
@@ -3917,7 +3917,7 @@
             <a:fld id="{B61BEF0D-F0BB-DE4B-95CE-6DB70DBA9567}" type="datetimeFigureOut">
               <a:rPr lang="en-US" dirty="0"/>
               <a:pPr/>
-              <a:t>11/11/2016</a:t>
+              <a:t>11/12/2016</a:t>
             </a:fld>
             <a:endParaRPr lang="en-US" dirty="0"/>
           </a:p>
@@ -4009,7 +4009,7 @@
             <a:fld id="{B61BEF0D-F0BB-DE4B-95CE-6DB70DBA9567}" type="datetimeFigureOut">
               <a:rPr lang="en-US" dirty="0"/>
               <a:pPr/>
-              <a:t>11/11/2016</a:t>
+              <a:t>11/12/2016</a:t>
             </a:fld>
             <a:endParaRPr lang="en-US" dirty="0"/>
           </a:p>
@@ -4260,7 +4260,7 @@
           <a:p>
             <a:fld id="{42A54C80-263E-416B-A8E0-580EDEADCBDC}" type="datetimeFigureOut">
               <a:rPr lang="en-US" dirty="0"/>
-              <a:t>11/11/2016</a:t>
+              <a:t>11/12/2016</a:t>
             </a:fld>
             <a:endParaRPr lang="en-US" dirty="0"/>
           </a:p>
@@ -4519,7 +4519,7 @@
             <a:fld id="{B61BEF0D-F0BB-DE4B-95CE-6DB70DBA9567}" type="datetimeFigureOut">
               <a:rPr lang="en-US" dirty="0"/>
               <a:pPr/>
-              <a:t>11/11/2016</a:t>
+              <a:t>11/12/2016</a:t>
             </a:fld>
             <a:endParaRPr lang="en-US" dirty="0"/>
           </a:p>
@@ -5259,7 +5259,7 @@
             <a:fld id="{B61BEF0D-F0BB-DE4B-95CE-6DB70DBA9567}" type="datetimeFigureOut">
               <a:rPr lang="en-US" dirty="0"/>
               <a:pPr/>
-              <a:t>11/11/2016</a:t>
+              <a:t>11/12/2016</a:t>
             </a:fld>
             <a:endParaRPr lang="en-US" dirty="0"/>
           </a:p>
@@ -5789,14 +5789,26 @@
             <p:ph type="ctrTitle"/>
           </p:nvPr>
         </p:nvSpPr>
-        <p:spPr/>
+        <p:spPr>
+          <a:xfrm>
+            <a:off x="1158240" y="2404534"/>
+            <a:ext cx="8115764" cy="1646302"/>
+          </a:xfrm>
+        </p:spPr>
         <p:txBody>
           <a:bodyPr/>
           <a:lstStyle/>
           <a:p>
             <a:r>
               <a:rPr lang="en-US" dirty="0"/>
-              <a:t>Traffic Jam Preventer</a:t>
+              <a:t>Cloud9 </a:t>
+            </a:r>
+            <a:br>
+              <a:rPr lang="en-US" dirty="0"/>
+            </a:br>
+            <a:r>
+              <a:rPr lang="en-US" dirty="0"/>
+              <a:t>Efficient Traffic Network</a:t>
             </a:r>
             <a:br>
               <a:rPr lang="en-US" dirty="0"/>
@@ -6363,35 +6375,73 @@
       </p:grpSpPr>
       <p:sp>
         <p:nvSpPr>
-          <p:cNvPr id="2" name="Title 1"/>
-          <p:cNvSpPr>
-            <a:spLocks noGrp="1"/>
-          </p:cNvSpPr>
-          <p:nvPr>
-            <p:ph type="title"/>
-          </p:nvPr>
-        </p:nvSpPr>
-        <p:spPr/>
-        <p:txBody>
-          <a:bodyPr/>
+          <p:cNvPr id="4" name="TextBox 3"/>
+          <p:cNvSpPr txBox="1"/>
+          <p:nvPr/>
+        </p:nvSpPr>
+        <p:spPr>
+          <a:xfrm>
+            <a:off x="577449" y="504957"/>
+            <a:ext cx="1038554" cy="369332"/>
+          </a:xfrm>
+          <a:prstGeom prst="rect">
+            <a:avLst/>
+          </a:prstGeom>
+          <a:noFill/>
+        </p:spPr>
+        <p:txBody>
+          <a:bodyPr wrap="none" rtlCol="0">
+            <a:spAutoFit/>
+          </a:bodyPr>
           <a:lstStyle/>
           <a:p>
             <a:r>
               <a:rPr lang="en-US" dirty="0"/>
-              <a:t>EPN Design</a:t>
-            </a:r>
-          </a:p>
-        </p:txBody>
-      </p:sp>
-      <p:sp>
-        <p:nvSpPr>
-          <p:cNvPr id="104" name="Rectangle: Rounded Corners 103"/>
+              <a:t>Producer</a:t>
+            </a:r>
+            <a:endParaRPr lang="en-SG" dirty="0"/>
+          </a:p>
+        </p:txBody>
+      </p:sp>
+      <p:sp>
+        <p:nvSpPr>
+          <p:cNvPr id="5" name="TextBox 4"/>
+          <p:cNvSpPr txBox="1"/>
+          <p:nvPr/>
+        </p:nvSpPr>
+        <p:spPr>
+          <a:xfrm>
+            <a:off x="10393336" y="504957"/>
+            <a:ext cx="1143262" cy="369332"/>
+          </a:xfrm>
+          <a:prstGeom prst="rect">
+            <a:avLst/>
+          </a:prstGeom>
+          <a:noFill/>
+        </p:spPr>
+        <p:txBody>
+          <a:bodyPr wrap="none" rtlCol="0">
+            <a:spAutoFit/>
+          </a:bodyPr>
+          <a:lstStyle/>
+          <a:p>
+            <a:r>
+              <a:rPr lang="en-US" dirty="0"/>
+              <a:t>Consumer</a:t>
+            </a:r>
+            <a:endParaRPr lang="en-SG" dirty="0"/>
+          </a:p>
+        </p:txBody>
+      </p:sp>
+      <p:sp>
+        <p:nvSpPr>
+          <p:cNvPr id="7" name="Rectangle: Rounded Corners 6"/>
           <p:cNvSpPr/>
           <p:nvPr/>
         </p:nvSpPr>
         <p:spPr>
           <a:xfrm>
-            <a:off x="202110" y="2611664"/>
+            <a:off x="567872" y="2055070"/>
             <a:ext cx="1068920" cy="566057"/>
           </a:xfrm>
           <a:prstGeom prst="roundRect">
@@ -6426,13 +6476,13 @@
       </p:sp>
       <p:sp>
         <p:nvSpPr>
-          <p:cNvPr id="105" name="Isosceles Triangle 104"/>
+          <p:cNvPr id="8" name="Isosceles Triangle 7"/>
           <p:cNvSpPr/>
           <p:nvPr/>
         </p:nvSpPr>
         <p:spPr>
           <a:xfrm rot="5400000">
-            <a:off x="1157818" y="2802248"/>
+            <a:off x="1523580" y="2245654"/>
             <a:ext cx="226423" cy="184888"/>
           </a:xfrm>
           <a:prstGeom prst="triangle">
@@ -6469,13 +6519,13 @@
       </p:sp>
       <p:sp>
         <p:nvSpPr>
-          <p:cNvPr id="106" name="TextBox 105"/>
+          <p:cNvPr id="9" name="TextBox 8"/>
           <p:cNvSpPr txBox="1"/>
           <p:nvPr/>
         </p:nvSpPr>
         <p:spPr>
           <a:xfrm>
-            <a:off x="202110" y="2611664"/>
+            <a:off x="567872" y="2055070"/>
             <a:ext cx="338554" cy="215444"/>
           </a:xfrm>
           <a:prstGeom prst="rect">
@@ -6491,7 +6541,7 @@
           <a:p>
             <a:r>
               <a:rPr lang="en-US" sz="800" dirty="0"/>
-              <a:t>EP1</a:t>
+              <a:t>EP2</a:t>
             </a:r>
             <a:endParaRPr lang="en-SG" sz="800" dirty="0"/>
           </a:p>
@@ -6499,13 +6549,13 @@
       </p:sp>
       <p:sp>
         <p:nvSpPr>
-          <p:cNvPr id="107" name="TextBox 106"/>
+          <p:cNvPr id="10" name="TextBox 9"/>
           <p:cNvSpPr txBox="1"/>
           <p:nvPr/>
         </p:nvSpPr>
         <p:spPr>
           <a:xfrm>
-            <a:off x="228257" y="2781480"/>
+            <a:off x="594019" y="2224886"/>
             <a:ext cx="950327" cy="400110"/>
           </a:xfrm>
           <a:prstGeom prst="rect">
@@ -6529,13 +6579,13 @@
       </p:sp>
       <p:sp>
         <p:nvSpPr>
-          <p:cNvPr id="108" name="Rectangle: Rounded Corners 107"/>
+          <p:cNvPr id="11" name="Rectangle: Rounded Corners 10"/>
           <p:cNvSpPr/>
           <p:nvPr/>
         </p:nvSpPr>
         <p:spPr>
           <a:xfrm>
-            <a:off x="9508160" y="2902092"/>
+            <a:off x="10430507" y="2345498"/>
             <a:ext cx="1068920" cy="566057"/>
           </a:xfrm>
           <a:prstGeom prst="roundRect">
@@ -6570,13 +6620,13 @@
       </p:sp>
       <p:sp>
         <p:nvSpPr>
-          <p:cNvPr id="109" name="Isosceles Triangle 108"/>
+          <p:cNvPr id="12" name="Isosceles Triangle 11"/>
           <p:cNvSpPr/>
           <p:nvPr/>
         </p:nvSpPr>
         <p:spPr>
           <a:xfrm rot="5400000">
-            <a:off x="9394947" y="3158830"/>
+            <a:off x="10317294" y="2602236"/>
             <a:ext cx="226423" cy="184888"/>
           </a:xfrm>
           <a:prstGeom prst="triangle">
@@ -6613,13 +6663,13 @@
       </p:sp>
       <p:sp>
         <p:nvSpPr>
-          <p:cNvPr id="110" name="TextBox 109"/>
+          <p:cNvPr id="13" name="TextBox 12"/>
           <p:cNvSpPr txBox="1"/>
           <p:nvPr/>
         </p:nvSpPr>
         <p:spPr>
           <a:xfrm>
-            <a:off x="9508160" y="2902092"/>
+            <a:off x="10430507" y="2345498"/>
             <a:ext cx="340158" cy="215444"/>
           </a:xfrm>
           <a:prstGeom prst="rect">
@@ -6643,13 +6693,13 @@
       </p:sp>
       <p:sp>
         <p:nvSpPr>
-          <p:cNvPr id="111" name="Rectangle 110"/>
+          <p:cNvPr id="14" name="Rectangle 13"/>
           <p:cNvSpPr/>
           <p:nvPr/>
         </p:nvSpPr>
         <p:spPr>
           <a:xfrm>
-            <a:off x="9518647" y="3049318"/>
+            <a:off x="10462360" y="2930605"/>
             <a:ext cx="1287153" cy="461665"/>
           </a:xfrm>
           <a:prstGeom prst="rect">
@@ -6671,14 +6721,14 @@
       </p:sp>
       <p:sp>
         <p:nvSpPr>
-          <p:cNvPr id="112" name="Rectangle: Rounded Corners 111"/>
+          <p:cNvPr id="15" name="Rectangle: Rounded Corners 14"/>
           <p:cNvSpPr/>
           <p:nvPr/>
         </p:nvSpPr>
         <p:spPr>
           <a:xfrm>
-            <a:off x="3223183" y="1653642"/>
-            <a:ext cx="1632857" cy="885894"/>
+            <a:off x="3779769" y="944647"/>
+            <a:ext cx="1632857" cy="870525"/>
           </a:xfrm>
           <a:prstGeom prst="roundRect">
             <a:avLst/>
@@ -6712,13 +6762,13 @@
       </p:sp>
       <p:sp>
         <p:nvSpPr>
-          <p:cNvPr id="113" name="TextBox 112"/>
+          <p:cNvPr id="17" name="TextBox 16"/>
           <p:cNvSpPr txBox="1"/>
           <p:nvPr/>
         </p:nvSpPr>
         <p:spPr>
           <a:xfrm>
-            <a:off x="3223184" y="1653642"/>
+            <a:off x="3778338" y="940074"/>
             <a:ext cx="1236236" cy="215444"/>
           </a:xfrm>
           <a:prstGeom prst="rect">
@@ -6742,13 +6792,13 @@
       </p:sp>
       <p:sp>
         <p:nvSpPr>
-          <p:cNvPr id="114" name="Isosceles Triangle 113"/>
+          <p:cNvPr id="21" name="Isosceles Triangle 20"/>
           <p:cNvSpPr/>
           <p:nvPr/>
         </p:nvSpPr>
         <p:spPr>
           <a:xfrm rot="5400000">
-            <a:off x="3136119" y="1738635"/>
+            <a:off x="3692705" y="1182041"/>
             <a:ext cx="226423" cy="184888"/>
           </a:xfrm>
           <a:prstGeom prst="triangle">
@@ -6785,15 +6835,15 @@
       </p:sp>
       <p:cxnSp>
         <p:nvCxnSpPr>
-          <p:cNvPr id="115" name="Straight Connector 114"/>
+          <p:cNvPr id="26" name="Straight Connector 25"/>
           <p:cNvCxnSpPr>
-            <a:endCxn id="119" idx="3"/>
+            <a:endCxn id="32" idx="3"/>
           </p:cNvCxnSpPr>
           <p:nvPr/>
         </p:nvCxnSpPr>
         <p:spPr>
           <a:xfrm>
-            <a:off x="4995638" y="1823459"/>
+            <a:off x="5552224" y="1266865"/>
             <a:ext cx="1609040" cy="9370"/>
           </a:xfrm>
           <a:prstGeom prst="line">
@@ -6817,14 +6867,14 @@
       </p:cxnSp>
       <p:sp>
         <p:nvSpPr>
-          <p:cNvPr id="116" name="Rectangle: Rounded Corners 115"/>
+          <p:cNvPr id="27" name="Rectangle: Rounded Corners 26"/>
           <p:cNvSpPr/>
           <p:nvPr/>
         </p:nvSpPr>
         <p:spPr>
           <a:xfrm>
-            <a:off x="6661981" y="1663012"/>
-            <a:ext cx="1632857" cy="885894"/>
+            <a:off x="7218567" y="960518"/>
+            <a:ext cx="1632857" cy="882723"/>
           </a:xfrm>
           <a:prstGeom prst="roundRect">
             <a:avLst/>
@@ -6858,13 +6908,13 @@
       </p:sp>
       <p:sp>
         <p:nvSpPr>
-          <p:cNvPr id="117" name="Isosceles Triangle 116"/>
+          <p:cNvPr id="28" name="Isosceles Triangle 27"/>
           <p:cNvSpPr/>
           <p:nvPr/>
         </p:nvSpPr>
         <p:spPr>
           <a:xfrm rot="5400000">
-            <a:off x="8228780" y="1740384"/>
+            <a:off x="8785366" y="1183790"/>
             <a:ext cx="226423" cy="184888"/>
           </a:xfrm>
           <a:prstGeom prst="triangle">
@@ -6901,43 +6951,13 @@
       </p:sp>
       <p:sp>
         <p:nvSpPr>
-          <p:cNvPr id="118" name="TextBox 117"/>
-          <p:cNvSpPr txBox="1"/>
-          <p:nvPr/>
-        </p:nvSpPr>
-        <p:spPr>
-          <a:xfrm>
-            <a:off x="6661982" y="1663012"/>
-            <a:ext cx="835485" cy="215444"/>
-          </a:xfrm>
-          <a:prstGeom prst="rect">
-            <a:avLst/>
-          </a:prstGeom>
-          <a:noFill/>
-        </p:spPr>
-        <p:txBody>
-          <a:bodyPr wrap="none" rtlCol="0">
-            <a:spAutoFit/>
-          </a:bodyPr>
-          <a:lstStyle/>
-          <a:p>
-            <a:r>
-              <a:rPr lang="en-US" sz="800" dirty="0"/>
-              <a:t>EPA5: Translate</a:t>
-            </a:r>
-            <a:endParaRPr lang="en-SG" sz="800" dirty="0"/>
-          </a:p>
-        </p:txBody>
-      </p:sp>
-      <p:sp>
-        <p:nvSpPr>
-          <p:cNvPr id="119" name="Isosceles Triangle 118"/>
+          <p:cNvPr id="32" name="Isosceles Triangle 31"/>
           <p:cNvSpPr/>
           <p:nvPr/>
         </p:nvSpPr>
         <p:spPr>
           <a:xfrm rot="5400000">
-            <a:off x="6583910" y="1740384"/>
+            <a:off x="7140496" y="1183790"/>
             <a:ext cx="226423" cy="184888"/>
           </a:xfrm>
           <a:prstGeom prst="triangle">
@@ -6974,14 +6994,14 @@
       </p:sp>
       <p:sp>
         <p:nvSpPr>
-          <p:cNvPr id="120" name="TextBox 119"/>
+          <p:cNvPr id="42" name="TextBox 41"/>
           <p:cNvSpPr txBox="1"/>
           <p:nvPr/>
         </p:nvSpPr>
         <p:spPr>
           <a:xfrm>
-            <a:off x="6735424" y="1946692"/>
-            <a:ext cx="1387040" cy="507831"/>
+            <a:off x="7350276" y="2079237"/>
+            <a:ext cx="1387040" cy="1061829"/>
           </a:xfrm>
           <a:prstGeom prst="rect">
             <a:avLst/>
@@ -7010,19 +7030,41 @@
               <a:rPr lang="en-US" sz="900" dirty="0" err="1"/>
               <a:t>AlternativeRoad</a:t>
             </a:r>
+            <a:endParaRPr lang="en-US" sz="900" dirty="0"/>
+          </a:p>
+          <a:p>
+            <a:endParaRPr lang="en-US" sz="900" dirty="0"/>
+          </a:p>
+          <a:p>
+            <a:r>
+              <a:rPr lang="en-SG" sz="900" dirty="0"/>
+              <a:t>message  =  “Traffic building at” </a:t>
+            </a:r>
+            <a:r>
+              <a:rPr lang="en-SG" sz="900" dirty="0" err="1"/>
+              <a:t>Roadname</a:t>
+            </a:r>
+            <a:r>
+              <a:rPr lang="en-SG" sz="900" dirty="0"/>
+              <a:t>. “exit at” </a:t>
+            </a:r>
+            <a:r>
+              <a:rPr lang="en-SG" sz="900" dirty="0" err="1"/>
+              <a:t>AlternativeRoad</a:t>
+            </a:r>
             <a:endParaRPr lang="en-SG" sz="900" dirty="0"/>
           </a:p>
         </p:txBody>
       </p:sp>
       <p:sp>
         <p:nvSpPr>
-          <p:cNvPr id="121" name="Rectangle: Rounded Corners 120"/>
+          <p:cNvPr id="38" name="Rectangle: Rounded Corners 37"/>
           <p:cNvSpPr/>
           <p:nvPr/>
         </p:nvSpPr>
         <p:spPr>
           <a:xfrm>
-            <a:off x="236172" y="4243028"/>
+            <a:off x="562179" y="3686434"/>
             <a:ext cx="1068920" cy="566057"/>
           </a:xfrm>
           <a:prstGeom prst="roundRect">
@@ -7057,13 +7099,13 @@
       </p:sp>
       <p:sp>
         <p:nvSpPr>
-          <p:cNvPr id="122" name="Isosceles Triangle 121"/>
+          <p:cNvPr id="40" name="Isosceles Triangle 39"/>
           <p:cNvSpPr/>
           <p:nvPr/>
         </p:nvSpPr>
         <p:spPr>
           <a:xfrm rot="5400000">
-            <a:off x="1191880" y="4433612"/>
+            <a:off x="1517887" y="3877018"/>
             <a:ext cx="226423" cy="184888"/>
           </a:xfrm>
           <a:prstGeom prst="triangle">
@@ -7100,13 +7142,13 @@
       </p:sp>
       <p:sp>
         <p:nvSpPr>
-          <p:cNvPr id="123" name="TextBox 122"/>
+          <p:cNvPr id="41" name="TextBox 40"/>
           <p:cNvSpPr txBox="1"/>
           <p:nvPr/>
         </p:nvSpPr>
         <p:spPr>
           <a:xfrm>
-            <a:off x="236172" y="4243028"/>
+            <a:off x="562179" y="3686434"/>
             <a:ext cx="338554" cy="215444"/>
           </a:xfrm>
           <a:prstGeom prst="rect">
@@ -7130,13 +7172,13 @@
       </p:sp>
       <p:sp>
         <p:nvSpPr>
-          <p:cNvPr id="124" name="TextBox 123"/>
+          <p:cNvPr id="43" name="TextBox 42"/>
           <p:cNvSpPr txBox="1"/>
           <p:nvPr/>
         </p:nvSpPr>
         <p:spPr>
           <a:xfrm>
-            <a:off x="262319" y="4412844"/>
+            <a:off x="588326" y="3856250"/>
             <a:ext cx="950327" cy="400110"/>
           </a:xfrm>
           <a:prstGeom prst="rect">
@@ -7164,14 +7206,14 @@
       </p:sp>
       <p:sp>
         <p:nvSpPr>
-          <p:cNvPr id="125" name="Rectangle 124"/>
+          <p:cNvPr id="53" name="Rectangle 52"/>
           <p:cNvSpPr/>
           <p:nvPr/>
         </p:nvSpPr>
         <p:spPr>
           <a:xfrm>
-            <a:off x="6793782" y="3042168"/>
-            <a:ext cx="1384685" cy="507831"/>
+            <a:off x="7357377" y="1043906"/>
+            <a:ext cx="1455764" cy="784830"/>
           </a:xfrm>
           <a:prstGeom prst="rect">
             <a:avLst/>
@@ -7185,33 +7227,29 @@
           <a:p>
             <a:r>
               <a:rPr lang="en-SG" sz="900" dirty="0"/>
-              <a:t>message  =  “Traffic building at” </a:t>
-            </a:r>
-            <a:r>
-              <a:rPr lang="en-SG" sz="900" dirty="0" err="1"/>
-              <a:t>Roadname</a:t>
-            </a:r>
+              <a:t>message  =  “Lesser traffic” at road</a:t>
+            </a:r>
+          </a:p>
+          <a:p>
+            <a:endParaRPr lang="en-US" sz="900" dirty="0"/>
+          </a:p>
+          <a:p>
             <a:r>
               <a:rPr lang="en-SG" sz="900" dirty="0"/>
-              <a:t>. “exit at” </a:t>
-            </a:r>
-            <a:r>
-              <a:rPr lang="en-SG" sz="900" dirty="0" err="1"/>
-              <a:t>AlternativeRoad</a:t>
-            </a:r>
-            <a:endParaRPr lang="en-SG" sz="900" dirty="0"/>
-          </a:p>
-        </p:txBody>
-      </p:sp>
-      <p:sp>
-        <p:nvSpPr>
-          <p:cNvPr id="126" name="Hexagon 125"/>
+              <a:t>message  =  “slowdown” at road</a:t>
+            </a:r>
+          </a:p>
+        </p:txBody>
+      </p:sp>
+      <p:sp>
+        <p:nvSpPr>
+          <p:cNvPr id="55" name="Hexagon 54"/>
           <p:cNvSpPr/>
           <p:nvPr/>
         </p:nvSpPr>
         <p:spPr>
           <a:xfrm>
-            <a:off x="1650464" y="2663094"/>
+            <a:off x="1960560" y="2106500"/>
             <a:ext cx="774943" cy="467052"/>
           </a:xfrm>
           <a:prstGeom prst="hexagon">
@@ -7246,15 +7284,15 @@
       </p:sp>
       <p:cxnSp>
         <p:nvCxnSpPr>
-          <p:cNvPr id="127" name="Straight Connector 126"/>
+          <p:cNvPr id="57" name="Straight Connector 56"/>
           <p:cNvCxnSpPr>
-            <a:stCxn id="105" idx="0"/>
+            <a:stCxn id="8" idx="0"/>
           </p:cNvCxnSpPr>
           <p:nvPr/>
         </p:nvCxnSpPr>
         <p:spPr>
           <a:xfrm>
-            <a:off x="1363474" y="2894693"/>
+            <a:off x="1729236" y="2338099"/>
             <a:ext cx="290614" cy="1895"/>
           </a:xfrm>
           <a:prstGeom prst="line">
@@ -7278,17 +7316,17 @@
       </p:cxnSp>
       <p:cxnSp>
         <p:nvCxnSpPr>
-          <p:cNvPr id="128" name="Connector: Elbow 127"/>
+          <p:cNvPr id="59" name="Connector: Elbow 58"/>
           <p:cNvCxnSpPr>
-            <a:stCxn id="126" idx="0"/>
-            <a:endCxn id="114" idx="3"/>
+            <a:stCxn id="55" idx="0"/>
+            <a:endCxn id="21" idx="3"/>
           </p:cNvCxnSpPr>
           <p:nvPr/>
         </p:nvCxnSpPr>
         <p:spPr>
           <a:xfrm flipV="1">
-            <a:off x="2425407" y="1831080"/>
-            <a:ext cx="731480" cy="1065540"/>
+            <a:off x="2735503" y="1274486"/>
+            <a:ext cx="977970" cy="1065540"/>
           </a:xfrm>
           <a:prstGeom prst="bentConnector3">
             <a:avLst>
@@ -7313,13 +7351,13 @@
       </p:cxnSp>
       <p:sp>
         <p:nvSpPr>
-          <p:cNvPr id="129" name="TextBox 128"/>
+          <p:cNvPr id="61" name="TextBox 60"/>
           <p:cNvSpPr txBox="1"/>
           <p:nvPr/>
         </p:nvSpPr>
         <p:spPr>
           <a:xfrm>
-            <a:off x="1753956" y="2786286"/>
+            <a:off x="2064052" y="2229692"/>
             <a:ext cx="579005" cy="215444"/>
           </a:xfrm>
           <a:prstGeom prst="rect">
@@ -7343,17 +7381,17 @@
       </p:sp>
       <p:cxnSp>
         <p:nvCxnSpPr>
-          <p:cNvPr id="130" name="Connector: Elbow 129"/>
+          <p:cNvPr id="72" name="Connector: Elbow 71"/>
           <p:cNvCxnSpPr>
-            <a:stCxn id="117" idx="0"/>
-            <a:endCxn id="109" idx="3"/>
+            <a:stCxn id="28" idx="0"/>
+            <a:endCxn id="12" idx="3"/>
           </p:cNvCxnSpPr>
           <p:nvPr/>
         </p:nvCxnSpPr>
         <p:spPr>
           <a:xfrm>
-            <a:off x="8434436" y="1832829"/>
-            <a:ext cx="981279" cy="1418446"/>
+            <a:off x="8991022" y="1276235"/>
+            <a:ext cx="1347040" cy="1418446"/>
           </a:xfrm>
           <a:prstGeom prst="bentConnector3">
             <a:avLst/>
@@ -7376,14 +7414,14 @@
       </p:cxnSp>
       <p:sp>
         <p:nvSpPr>
-          <p:cNvPr id="131" name="Rectangle: Rounded Corners 130"/>
+          <p:cNvPr id="73" name="Rectangle: Rounded Corners 72"/>
           <p:cNvSpPr/>
           <p:nvPr/>
         </p:nvSpPr>
         <p:spPr>
           <a:xfrm>
-            <a:off x="6683347" y="2817635"/>
-            <a:ext cx="1632857" cy="885894"/>
+            <a:off x="7239933" y="2083079"/>
+            <a:ext cx="1632857" cy="1192934"/>
           </a:xfrm>
           <a:prstGeom prst="roundRect">
             <a:avLst/>
@@ -7417,13 +7455,13 @@
       </p:sp>
       <p:sp>
         <p:nvSpPr>
-          <p:cNvPr id="132" name="Isosceles Triangle 131"/>
+          <p:cNvPr id="74" name="Isosceles Triangle 73"/>
           <p:cNvSpPr/>
           <p:nvPr/>
         </p:nvSpPr>
         <p:spPr>
           <a:xfrm rot="5400000">
-            <a:off x="8250146" y="2895007"/>
+            <a:off x="8806732" y="2338413"/>
             <a:ext cx="226423" cy="184888"/>
           </a:xfrm>
           <a:prstGeom prst="triangle">
@@ -7460,43 +7498,13 @@
       </p:sp>
       <p:sp>
         <p:nvSpPr>
-          <p:cNvPr id="133" name="TextBox 132"/>
-          <p:cNvSpPr txBox="1"/>
-          <p:nvPr/>
-        </p:nvSpPr>
-        <p:spPr>
-          <a:xfrm>
-            <a:off x="6683348" y="2817635"/>
-            <a:ext cx="835485" cy="215444"/>
-          </a:xfrm>
-          <a:prstGeom prst="rect">
-            <a:avLst/>
-          </a:prstGeom>
-          <a:noFill/>
-        </p:spPr>
-        <p:txBody>
-          <a:bodyPr wrap="none" rtlCol="0">
-            <a:spAutoFit/>
-          </a:bodyPr>
-          <a:lstStyle/>
-          <a:p>
-            <a:r>
-              <a:rPr lang="en-US" sz="800" dirty="0"/>
-              <a:t>EPA6: Translate</a:t>
-            </a:r>
-            <a:endParaRPr lang="en-SG" sz="800" dirty="0"/>
-          </a:p>
-        </p:txBody>
-      </p:sp>
-      <p:sp>
-        <p:nvSpPr>
-          <p:cNvPr id="134" name="Isosceles Triangle 133"/>
+          <p:cNvPr id="77" name="Isosceles Triangle 76"/>
           <p:cNvSpPr/>
           <p:nvPr/>
         </p:nvSpPr>
         <p:spPr>
           <a:xfrm rot="5400000">
-            <a:off x="6605276" y="2921134"/>
+            <a:off x="7161862" y="2364540"/>
             <a:ext cx="226423" cy="184888"/>
           </a:xfrm>
           <a:prstGeom prst="triangle">
@@ -7533,17 +7541,17 @@
       </p:sp>
       <p:cxnSp>
         <p:nvCxnSpPr>
-          <p:cNvPr id="135" name="Connector: Elbow 134"/>
+          <p:cNvPr id="87" name="Connector: Elbow 86"/>
           <p:cNvCxnSpPr>
-            <a:stCxn id="132" idx="0"/>
-            <a:endCxn id="109" idx="3"/>
+            <a:stCxn id="74" idx="0"/>
+            <a:endCxn id="12" idx="3"/>
           </p:cNvCxnSpPr>
           <p:nvPr/>
         </p:nvCxnSpPr>
         <p:spPr>
           <a:xfrm>
-            <a:off x="8455802" y="2987452"/>
-            <a:ext cx="959913" cy="263823"/>
+            <a:off x="9012388" y="2430858"/>
+            <a:ext cx="1325674" cy="263823"/>
           </a:xfrm>
           <a:prstGeom prst="bentConnector3">
             <a:avLst>
@@ -7568,14 +7576,14 @@
       </p:cxnSp>
       <p:sp>
         <p:nvSpPr>
-          <p:cNvPr id="136" name="Rectangle: Rounded Corners 135"/>
+          <p:cNvPr id="92" name="Rectangle: Rounded Corners 91"/>
           <p:cNvSpPr/>
           <p:nvPr/>
         </p:nvSpPr>
         <p:spPr>
           <a:xfrm>
-            <a:off x="3227394" y="2768680"/>
-            <a:ext cx="1632857" cy="885894"/>
+            <a:off x="3783980" y="1999052"/>
+            <a:ext cx="1632857" cy="1246036"/>
           </a:xfrm>
           <a:prstGeom prst="roundRect">
             <a:avLst/>
@@ -7609,13 +7617,13 @@
       </p:sp>
       <p:sp>
         <p:nvSpPr>
-          <p:cNvPr id="137" name="TextBox 136"/>
+          <p:cNvPr id="93" name="TextBox 92"/>
           <p:cNvSpPr txBox="1"/>
           <p:nvPr/>
         </p:nvSpPr>
         <p:spPr>
           <a:xfrm>
-            <a:off x="3275557" y="2814959"/>
+            <a:off x="3840046" y="2021674"/>
             <a:ext cx="1236236" cy="215444"/>
           </a:xfrm>
           <a:prstGeom prst="rect">
@@ -7631,7 +7639,7 @@
           <a:p>
             <a:r>
               <a:rPr lang="en-US" sz="800" dirty="0"/>
-              <a:t>EPA3: Pattern - Temporal</a:t>
+              <a:t>EPA2: Pattern - Temporal</a:t>
             </a:r>
             <a:endParaRPr lang="en-SG" sz="800" dirty="0"/>
           </a:p>
@@ -7639,13 +7647,13 @@
       </p:sp>
       <p:sp>
         <p:nvSpPr>
-          <p:cNvPr id="138" name="Isosceles Triangle 137"/>
+          <p:cNvPr id="94" name="Isosceles Triangle 93"/>
           <p:cNvSpPr/>
           <p:nvPr/>
         </p:nvSpPr>
         <p:spPr>
           <a:xfrm rot="5400000">
-            <a:off x="3145961" y="2928247"/>
+            <a:off x="3702547" y="2371653"/>
             <a:ext cx="226423" cy="184888"/>
           </a:xfrm>
           <a:prstGeom prst="triangle">
@@ -7682,13 +7690,13 @@
       </p:sp>
       <p:sp>
         <p:nvSpPr>
-          <p:cNvPr id="139" name="Isosceles Triangle 138"/>
+          <p:cNvPr id="95" name="Isosceles Triangle 94"/>
           <p:cNvSpPr/>
           <p:nvPr/>
         </p:nvSpPr>
         <p:spPr>
           <a:xfrm rot="5400000">
-            <a:off x="4791655" y="2922165"/>
+            <a:off x="5348241" y="2365571"/>
             <a:ext cx="226423" cy="184888"/>
           </a:xfrm>
           <a:prstGeom prst="triangle">
@@ -7723,19 +7731,122 @@
           </a:p>
         </p:txBody>
       </p:sp>
+      <p:sp>
+        <p:nvSpPr>
+          <p:cNvPr id="96" name="Isosceles Triangle 95"/>
+          <p:cNvSpPr/>
+          <p:nvPr/>
+        </p:nvSpPr>
+        <p:spPr>
+          <a:xfrm rot="5400000">
+            <a:off x="5354821" y="2779547"/>
+            <a:ext cx="226423" cy="184888"/>
+          </a:xfrm>
+          <a:prstGeom prst="triangle">
+            <a:avLst/>
+          </a:prstGeom>
+          <a:solidFill>
+            <a:srgbClr val="FFFF00"/>
+          </a:solidFill>
+        </p:spPr>
+        <p:style>
+          <a:lnRef idx="2">
+            <a:schemeClr val="accent1">
+              <a:shade val="50000"/>
+            </a:schemeClr>
+          </a:lnRef>
+          <a:fillRef idx="1">
+            <a:schemeClr val="accent1"/>
+          </a:fillRef>
+          <a:effectRef idx="0">
+            <a:schemeClr val="accent1"/>
+          </a:effectRef>
+          <a:fontRef idx="minor">
+            <a:schemeClr val="lt1"/>
+          </a:fontRef>
+        </p:style>
+        <p:txBody>
+          <a:bodyPr rtlCol="0" anchor="ctr"/>
+          <a:lstStyle/>
+          <a:p>
+            <a:pPr algn="ctr"/>
+            <a:endParaRPr lang="en-SG"/>
+          </a:p>
+        </p:txBody>
+      </p:sp>
+      <p:sp>
+        <p:nvSpPr>
+          <p:cNvPr id="97" name="TextBox 96"/>
+          <p:cNvSpPr txBox="1"/>
+          <p:nvPr/>
+        </p:nvSpPr>
+        <p:spPr>
+          <a:xfrm>
+            <a:off x="5452083" y="2242188"/>
+            <a:ext cx="482824" cy="215444"/>
+          </a:xfrm>
+          <a:prstGeom prst="rect">
+            <a:avLst/>
+          </a:prstGeom>
+          <a:noFill/>
+        </p:spPr>
+        <p:txBody>
+          <a:bodyPr wrap="none" rtlCol="0">
+            <a:spAutoFit/>
+          </a:bodyPr>
+          <a:lstStyle/>
+          <a:p>
+            <a:r>
+              <a:rPr lang="en-US" sz="800" dirty="0"/>
+              <a:t>Output</a:t>
+            </a:r>
+            <a:endParaRPr lang="en-SG" sz="800" dirty="0"/>
+          </a:p>
+        </p:txBody>
+      </p:sp>
+      <p:sp>
+        <p:nvSpPr>
+          <p:cNvPr id="98" name="TextBox 97"/>
+          <p:cNvSpPr txBox="1"/>
+          <p:nvPr/>
+        </p:nvSpPr>
+        <p:spPr>
+          <a:xfrm>
+            <a:off x="5446780" y="2902861"/>
+            <a:ext cx="716863" cy="215444"/>
+          </a:xfrm>
+          <a:prstGeom prst="rect">
+            <a:avLst/>
+          </a:prstGeom>
+          <a:noFill/>
+        </p:spPr>
+        <p:txBody>
+          <a:bodyPr wrap="none" rtlCol="0">
+            <a:spAutoFit/>
+          </a:bodyPr>
+          <a:lstStyle/>
+          <a:p>
+            <a:r>
+              <a:rPr lang="en-US" sz="800" dirty="0"/>
+              <a:t>Not Selected</a:t>
+            </a:r>
+            <a:endParaRPr lang="en-SG" sz="800" dirty="0"/>
+          </a:p>
+        </p:txBody>
+      </p:sp>
       <p:cxnSp>
         <p:nvCxnSpPr>
-          <p:cNvPr id="140" name="Connector: Elbow 139"/>
+          <p:cNvPr id="105" name="Connector: Elbow 104"/>
           <p:cNvCxnSpPr>
-            <a:stCxn id="126" idx="0"/>
-            <a:endCxn id="138" idx="3"/>
+            <a:stCxn id="55" idx="0"/>
+            <a:endCxn id="94" idx="3"/>
           </p:cNvCxnSpPr>
           <p:nvPr/>
         </p:nvCxnSpPr>
         <p:spPr>
           <a:xfrm>
-            <a:off x="2425407" y="2896620"/>
-            <a:ext cx="741322" cy="124072"/>
+            <a:off x="2735503" y="2340026"/>
+            <a:ext cx="987812" cy="124072"/>
           </a:xfrm>
           <a:prstGeom prst="bentConnector3">
             <a:avLst>
@@ -7760,14 +7871,14 @@
       </p:cxnSp>
       <p:sp>
         <p:nvSpPr>
-          <p:cNvPr id="141" name="Rectangle 140"/>
+          <p:cNvPr id="109" name="Rectangle 108"/>
           <p:cNvSpPr/>
           <p:nvPr/>
         </p:nvSpPr>
         <p:spPr>
           <a:xfrm>
-            <a:off x="3345837" y="2998839"/>
-            <a:ext cx="1722405" cy="507831"/>
+            <a:off x="3939107" y="1136546"/>
+            <a:ext cx="1722405" cy="646331"/>
           </a:xfrm>
           <a:prstGeom prst="rect">
             <a:avLst/>
@@ -7780,36 +7891,38 @@
           <a:lstStyle/>
           <a:p>
             <a:r>
-              <a:rPr lang="en-SG" sz="900" dirty="0"/>
-              <a:t>road category =  C/B &amp;</a:t>
-            </a:r>
-          </a:p>
-          <a:p>
-            <a:r>
-              <a:rPr lang="en-SG" sz="900" dirty="0"/>
-              <a:t>previous speed band = 3 &amp;</a:t>
-            </a:r>
-          </a:p>
-          <a:p>
-            <a:r>
-              <a:rPr lang="en-SG" sz="900" dirty="0"/>
-              <a:t>current speed band = 2</a:t>
-            </a:r>
+              <a:rPr lang="en-US" sz="900" dirty="0"/>
+              <a:t>Estimated travel increase</a:t>
+            </a:r>
+            <a:endParaRPr lang="en-SG" sz="900" dirty="0"/>
+          </a:p>
+          <a:p>
+            <a:endParaRPr lang="en-US" sz="900" dirty="0"/>
+          </a:p>
+          <a:p>
+            <a:endParaRPr lang="en-US" sz="900" dirty="0"/>
+          </a:p>
+          <a:p>
+            <a:r>
+              <a:rPr lang="en-US" sz="900" dirty="0"/>
+              <a:t>Estimated travel decrease</a:t>
+            </a:r>
+            <a:endParaRPr lang="en-SG" sz="900" dirty="0"/>
           </a:p>
         </p:txBody>
       </p:sp>
       <p:cxnSp>
         <p:nvCxnSpPr>
-          <p:cNvPr id="142" name="Straight Connector 141"/>
+          <p:cNvPr id="118" name="Straight Connector 117"/>
           <p:cNvCxnSpPr>
-            <a:stCxn id="139" idx="0"/>
-            <a:endCxn id="134" idx="3"/>
+            <a:stCxn id="95" idx="0"/>
+            <a:endCxn id="77" idx="3"/>
           </p:cNvCxnSpPr>
           <p:nvPr/>
         </p:nvCxnSpPr>
         <p:spPr>
           <a:xfrm flipV="1">
-            <a:off x="4997311" y="3013579"/>
+            <a:off x="5553897" y="2456985"/>
             <a:ext cx="1628733" cy="1031"/>
           </a:xfrm>
           <a:prstGeom prst="line">
@@ -7833,22 +7946,19 @@
       </p:cxnSp>
       <p:cxnSp>
         <p:nvCxnSpPr>
-          <p:cNvPr id="143" name="Connector: Elbow 142"/>
+          <p:cNvPr id="120" name="Connector: Elbow 119"/>
           <p:cNvCxnSpPr>
-            <a:stCxn id="156" idx="3"/>
-            <a:endCxn id="109" idx="3"/>
+            <a:endCxn id="12" idx="3"/>
           </p:cNvCxnSpPr>
           <p:nvPr/>
         </p:nvCxnSpPr>
         <p:spPr>
           <a:xfrm flipV="1">
-            <a:off x="8329978" y="3251275"/>
-            <a:ext cx="1085737" cy="1153664"/>
+            <a:off x="8991826" y="2694681"/>
+            <a:ext cx="1346236" cy="999776"/>
           </a:xfrm>
           <a:prstGeom prst="bentConnector3">
-            <a:avLst>
-              <a:gd name="adj1" fmla="val 56591"/>
-            </a:avLst>
+            <a:avLst/>
           </a:prstGeom>
         </p:spPr>
         <p:style>
@@ -7868,17 +7978,17 @@
       </p:cxnSp>
       <p:cxnSp>
         <p:nvCxnSpPr>
-          <p:cNvPr id="144" name="Connector: Elbow 143"/>
+          <p:cNvPr id="163" name="Connector: Elbow 162"/>
           <p:cNvCxnSpPr>
-            <a:stCxn id="172" idx="0"/>
-            <a:endCxn id="109" idx="3"/>
+            <a:stCxn id="189" idx="0"/>
+            <a:endCxn id="12" idx="3"/>
           </p:cNvCxnSpPr>
           <p:nvPr/>
         </p:nvCxnSpPr>
         <p:spPr>
           <a:xfrm flipV="1">
-            <a:off x="8455802" y="3251275"/>
-            <a:ext cx="959913" cy="2419070"/>
+            <a:off x="9036312" y="2694681"/>
+            <a:ext cx="1301750" cy="3243645"/>
           </a:xfrm>
           <a:prstGeom prst="bentConnector3">
             <a:avLst/>
@@ -7901,14 +8011,14 @@
       </p:cxnSp>
       <p:sp>
         <p:nvSpPr>
-          <p:cNvPr id="145" name="Rectangle 144"/>
+          <p:cNvPr id="104" name="Rectangle 103"/>
           <p:cNvSpPr/>
           <p:nvPr/>
         </p:nvSpPr>
         <p:spPr>
           <a:xfrm>
-            <a:off x="3354526" y="1875728"/>
-            <a:ext cx="1722405" cy="507831"/>
+            <a:off x="3945570" y="2137312"/>
+            <a:ext cx="1722405" cy="1200329"/>
           </a:xfrm>
           <a:prstGeom prst="rect">
             <a:avLst/>
@@ -7937,17 +8047,41 @@
               <a:t>current speed band = 1</a:t>
             </a:r>
           </a:p>
-        </p:txBody>
-      </p:sp>
-      <p:sp>
-        <p:nvSpPr>
-          <p:cNvPr id="146" name="Isosceles Triangle 145"/>
+          <a:p>
+            <a:endParaRPr lang="en-US" sz="900" dirty="0"/>
+          </a:p>
+          <a:p>
+            <a:r>
+              <a:rPr lang="en-SG" sz="900" dirty="0"/>
+              <a:t>road category =  C/B &amp;</a:t>
+            </a:r>
+          </a:p>
+          <a:p>
+            <a:r>
+              <a:rPr lang="en-SG" sz="900" dirty="0"/>
+              <a:t>previous speed band = 3 &amp;</a:t>
+            </a:r>
+          </a:p>
+          <a:p>
+            <a:r>
+              <a:rPr lang="en-SG" sz="900" dirty="0"/>
+              <a:t>current speed band = 2</a:t>
+            </a:r>
+          </a:p>
+          <a:p>
+            <a:endParaRPr lang="en-SG" sz="900" dirty="0"/>
+          </a:p>
+        </p:txBody>
+      </p:sp>
+      <p:sp>
+        <p:nvSpPr>
+          <p:cNvPr id="106" name="Isosceles Triangle 105"/>
           <p:cNvSpPr/>
           <p:nvPr/>
         </p:nvSpPr>
         <p:spPr>
           <a:xfrm rot="5400000">
-            <a:off x="4791926" y="1738178"/>
+            <a:off x="5348512" y="1181584"/>
             <a:ext cx="226423" cy="184888"/>
           </a:xfrm>
           <a:prstGeom prst="triangle">
@@ -7982,54 +8116,23 @@
           </a:p>
         </p:txBody>
       </p:sp>
-      <p:cxnSp>
-        <p:nvCxnSpPr>
-          <p:cNvPr id="147" name="Straight Connector 146"/>
-          <p:cNvCxnSpPr>
-            <a:stCxn id="122" idx="0"/>
-            <a:endCxn id="150" idx="3"/>
-          </p:cNvCxnSpPr>
-          <p:nvPr/>
-        </p:nvCxnSpPr>
-        <p:spPr>
-          <a:xfrm>
-            <a:off x="1397536" y="4526057"/>
-            <a:ext cx="1755928" cy="6293"/>
-          </a:xfrm>
-          <a:prstGeom prst="line">
-            <a:avLst/>
-          </a:prstGeom>
-        </p:spPr>
-        <p:style>
-          <a:lnRef idx="1">
-            <a:schemeClr val="accent1"/>
-          </a:lnRef>
-          <a:fillRef idx="0">
-            <a:schemeClr val="accent1"/>
-          </a:fillRef>
-          <a:effectRef idx="0">
-            <a:schemeClr val="accent1"/>
-          </a:effectRef>
-          <a:fontRef idx="minor">
-            <a:schemeClr val="tx1"/>
-          </a:fontRef>
-        </p:style>
-      </p:cxnSp>
-      <p:sp>
-        <p:nvSpPr>
-          <p:cNvPr id="148" name="Rectangle: Rounded Corners 147"/>
+      <p:sp>
+        <p:nvSpPr>
+          <p:cNvPr id="107" name="Isosceles Triangle 106"/>
           <p:cNvSpPr/>
           <p:nvPr/>
         </p:nvSpPr>
         <p:spPr>
-          <a:xfrm>
-            <a:off x="3212003" y="3905253"/>
-            <a:ext cx="1632857" cy="885894"/>
-          </a:xfrm>
-          <a:prstGeom prst="roundRect">
+          <a:xfrm rot="5400000">
+            <a:off x="5355092" y="1595560"/>
+            <a:ext cx="226423" cy="184888"/>
+          </a:xfrm>
+          <a:prstGeom prst="triangle">
             <a:avLst/>
           </a:prstGeom>
-          <a:noFill/>
+          <a:solidFill>
+            <a:srgbClr val="FFFF00"/>
+          </a:solidFill>
         </p:spPr>
         <p:style>
           <a:lnRef idx="2">
@@ -8058,14 +8161,14 @@
       </p:sp>
       <p:sp>
         <p:nvSpPr>
-          <p:cNvPr id="149" name="TextBox 148"/>
+          <p:cNvPr id="108" name="TextBox 107"/>
           <p:cNvSpPr txBox="1"/>
           <p:nvPr/>
         </p:nvSpPr>
         <p:spPr>
           <a:xfrm>
-            <a:off x="3260166" y="3951532"/>
-            <a:ext cx="1117614" cy="215444"/>
+            <a:off x="5452354" y="1058201"/>
+            <a:ext cx="482824" cy="215444"/>
           </a:xfrm>
           <a:prstGeom prst="rect">
             <a:avLst/>
@@ -8080,7 +8183,7 @@
           <a:p>
             <a:r>
               <a:rPr lang="en-US" sz="800" dirty="0"/>
-              <a:t>EPA3: Pattern - Spatial</a:t>
+              <a:t>Output</a:t>
             </a:r>
             <a:endParaRPr lang="en-SG" sz="800" dirty="0"/>
           </a:p>
@@ -8088,21 +8191,82 @@
       </p:sp>
       <p:sp>
         <p:nvSpPr>
-          <p:cNvPr id="150" name="Isosceles Triangle 149"/>
+          <p:cNvPr id="116" name="TextBox 115"/>
+          <p:cNvSpPr txBox="1"/>
+          <p:nvPr/>
+        </p:nvSpPr>
+        <p:spPr>
+          <a:xfrm>
+            <a:off x="5447051" y="1718874"/>
+            <a:ext cx="716863" cy="215444"/>
+          </a:xfrm>
+          <a:prstGeom prst="rect">
+            <a:avLst/>
+          </a:prstGeom>
+          <a:noFill/>
+        </p:spPr>
+        <p:txBody>
+          <a:bodyPr wrap="none" rtlCol="0">
+            <a:spAutoFit/>
+          </a:bodyPr>
+          <a:lstStyle/>
+          <a:p>
+            <a:r>
+              <a:rPr lang="en-US" sz="800" dirty="0"/>
+              <a:t>Not Selected</a:t>
+            </a:r>
+            <a:endParaRPr lang="en-SG" sz="800" dirty="0"/>
+          </a:p>
+        </p:txBody>
+      </p:sp>
+      <p:cxnSp>
+        <p:nvCxnSpPr>
+          <p:cNvPr id="130" name="Straight Connector 129"/>
+          <p:cNvCxnSpPr>
+            <a:stCxn id="40" idx="0"/>
+            <a:endCxn id="133" idx="3"/>
+          </p:cNvCxnSpPr>
+          <p:nvPr/>
+        </p:nvCxnSpPr>
+        <p:spPr>
+          <a:xfrm>
+            <a:off x="1723543" y="3969463"/>
+            <a:ext cx="1986507" cy="6293"/>
+          </a:xfrm>
+          <a:prstGeom prst="line">
+            <a:avLst/>
+          </a:prstGeom>
+        </p:spPr>
+        <p:style>
+          <a:lnRef idx="1">
+            <a:schemeClr val="accent1"/>
+          </a:lnRef>
+          <a:fillRef idx="0">
+            <a:schemeClr val="accent1"/>
+          </a:fillRef>
+          <a:effectRef idx="0">
+            <a:schemeClr val="accent1"/>
+          </a:effectRef>
+          <a:fontRef idx="minor">
+            <a:schemeClr val="tx1"/>
+          </a:fontRef>
+        </p:style>
+      </p:cxnSp>
+      <p:sp>
+        <p:nvSpPr>
+          <p:cNvPr id="131" name="Rectangle: Rounded Corners 130"/>
           <p:cNvSpPr/>
           <p:nvPr/>
         </p:nvSpPr>
         <p:spPr>
-          <a:xfrm rot="5400000">
-            <a:off x="3132696" y="4439905"/>
-            <a:ext cx="226423" cy="184888"/>
-          </a:xfrm>
-          <a:prstGeom prst="triangle">
+          <a:xfrm>
+            <a:off x="3768589" y="3348659"/>
+            <a:ext cx="1632857" cy="885894"/>
+          </a:xfrm>
+          <a:prstGeom prst="roundRect">
             <a:avLst/>
           </a:prstGeom>
-          <a:solidFill>
-            <a:srgbClr val="FFFF00"/>
-          </a:solidFill>
+          <a:noFill/>
         </p:spPr>
         <p:style>
           <a:lnRef idx="2">
@@ -8131,13 +8295,43 @@
       </p:sp>
       <p:sp>
         <p:nvSpPr>
-          <p:cNvPr id="151" name="Isosceles Triangle 150"/>
+          <p:cNvPr id="132" name="TextBox 131"/>
+          <p:cNvSpPr txBox="1"/>
+          <p:nvPr/>
+        </p:nvSpPr>
+        <p:spPr>
+          <a:xfrm>
+            <a:off x="3816752" y="3394938"/>
+            <a:ext cx="1117614" cy="215444"/>
+          </a:xfrm>
+          <a:prstGeom prst="rect">
+            <a:avLst/>
+          </a:prstGeom>
+          <a:noFill/>
+        </p:spPr>
+        <p:txBody>
+          <a:bodyPr wrap="none" rtlCol="0">
+            <a:spAutoFit/>
+          </a:bodyPr>
+          <a:lstStyle/>
+          <a:p>
+            <a:r>
+              <a:rPr lang="en-US" sz="800" dirty="0"/>
+              <a:t>EPA3: Pattern - Spatial</a:t>
+            </a:r>
+            <a:endParaRPr lang="en-SG" sz="800" dirty="0"/>
+          </a:p>
+        </p:txBody>
+      </p:sp>
+      <p:sp>
+        <p:nvSpPr>
+          <p:cNvPr id="133" name="Isosceles Triangle 132"/>
           <p:cNvSpPr/>
           <p:nvPr/>
         </p:nvSpPr>
         <p:spPr>
           <a:xfrm rot="5400000">
-            <a:off x="4776264" y="4058738"/>
+            <a:off x="3689282" y="3883311"/>
             <a:ext cx="226423" cy="184888"/>
           </a:xfrm>
           <a:prstGeom prst="triangle">
@@ -8174,53 +8368,13 @@
       </p:sp>
       <p:sp>
         <p:nvSpPr>
-          <p:cNvPr id="152" name="Rectangle 151"/>
+          <p:cNvPr id="134" name="Isosceles Triangle 133"/>
           <p:cNvSpPr/>
           <p:nvPr/>
         </p:nvSpPr>
         <p:spPr>
-          <a:xfrm>
-            <a:off x="3330446" y="4135412"/>
-            <a:ext cx="1722405" cy="507831"/>
-          </a:xfrm>
-          <a:prstGeom prst="rect">
-            <a:avLst/>
-          </a:prstGeom>
-        </p:spPr>
-        <p:txBody>
-          <a:bodyPr wrap="square">
-            <a:spAutoFit/>
-          </a:bodyPr>
-          <a:lstStyle/>
-          <a:p>
-            <a:r>
-              <a:rPr lang="en-SG" sz="900" dirty="0"/>
-              <a:t>road category =  C/B &amp;</a:t>
-            </a:r>
-          </a:p>
-          <a:p>
-            <a:r>
-              <a:rPr lang="en-SG" sz="900" dirty="0"/>
-              <a:t>current speed band = 2/3 &amp;</a:t>
-            </a:r>
-          </a:p>
-          <a:p>
-            <a:r>
-              <a:rPr lang="en-SG" sz="900" dirty="0"/>
-              <a:t>Forecast in area =HG/HR/HS/HT </a:t>
-            </a:r>
-          </a:p>
-        </p:txBody>
-      </p:sp>
-      <p:sp>
-        <p:nvSpPr>
-          <p:cNvPr id="153" name="Isosceles Triangle 152"/>
-          <p:cNvSpPr/>
-          <p:nvPr/>
-        </p:nvSpPr>
-        <p:spPr>
           <a:xfrm rot="5400000">
-            <a:off x="3115393" y="4038474"/>
+            <a:off x="5332850" y="3502144"/>
             <a:ext cx="226423" cy="184888"/>
           </a:xfrm>
           <a:prstGeom prst="triangle">
@@ -8255,84 +8409,23 @@
           </a:p>
         </p:txBody>
       </p:sp>
-      <p:cxnSp>
-        <p:nvCxnSpPr>
-          <p:cNvPr id="154" name="Connector: Elbow 153"/>
-          <p:cNvCxnSpPr>
-            <a:stCxn id="126" idx="0"/>
-            <a:endCxn id="153" idx="3"/>
-          </p:cNvCxnSpPr>
-          <p:nvPr/>
-        </p:nvCxnSpPr>
-        <p:spPr>
-          <a:xfrm>
-            <a:off x="2425407" y="2896620"/>
-            <a:ext cx="710754" cy="1234299"/>
-          </a:xfrm>
-          <a:prstGeom prst="bentConnector3">
-            <a:avLst>
-              <a:gd name="adj1" fmla="val 50000"/>
-            </a:avLst>
-          </a:prstGeom>
-        </p:spPr>
-        <p:style>
-          <a:lnRef idx="1">
-            <a:schemeClr val="accent1"/>
-          </a:lnRef>
-          <a:fillRef idx="0">
-            <a:schemeClr val="accent1"/>
-          </a:fillRef>
-          <a:effectRef idx="0">
-            <a:schemeClr val="accent1"/>
-          </a:effectRef>
-          <a:fontRef idx="minor">
-            <a:schemeClr val="tx1"/>
-          </a:fontRef>
-        </p:style>
-      </p:cxnSp>
-      <p:sp>
-        <p:nvSpPr>
-          <p:cNvPr id="155" name="Rectangle 154"/>
+      <p:sp>
+        <p:nvSpPr>
+          <p:cNvPr id="135" name="Isosceles Triangle 134"/>
           <p:cNvSpPr/>
           <p:nvPr/>
         </p:nvSpPr>
         <p:spPr>
-          <a:xfrm>
-            <a:off x="6807556" y="4186525"/>
-            <a:ext cx="1326513" cy="507831"/>
-          </a:xfrm>
-          <a:prstGeom prst="rect">
+          <a:xfrm rot="5400000">
+            <a:off x="5339430" y="3916120"/>
+            <a:ext cx="226423" cy="184888"/>
+          </a:xfrm>
+          <a:prstGeom prst="triangle">
             <a:avLst/>
           </a:prstGeom>
-        </p:spPr>
-        <p:txBody>
-          <a:bodyPr wrap="square">
-            <a:spAutoFit/>
-          </a:bodyPr>
-          <a:lstStyle/>
-          <a:p>
-            <a:r>
-              <a:rPr lang="en-SG" sz="900" dirty="0"/>
-              <a:t>message  =  “Heavy Rain expect in” Area.  Drive with caution”</a:t>
-            </a:r>
-          </a:p>
-        </p:txBody>
-      </p:sp>
-      <p:sp>
-        <p:nvSpPr>
-          <p:cNvPr id="156" name="Rectangle: Rounded Corners 155"/>
-          <p:cNvSpPr/>
-          <p:nvPr/>
-        </p:nvSpPr>
-        <p:spPr>
-          <a:xfrm>
-            <a:off x="6697121" y="3961992"/>
-            <a:ext cx="1632857" cy="885894"/>
-          </a:xfrm>
-          <a:prstGeom prst="roundRect">
-            <a:avLst/>
-          </a:prstGeom>
-          <a:noFill/>
+          <a:solidFill>
+            <a:srgbClr val="FFFF00"/>
+          </a:solidFill>
         </p:spPr>
         <p:style>
           <a:lnRef idx="2">
@@ -8361,13 +8454,113 @@
       </p:sp>
       <p:sp>
         <p:nvSpPr>
-          <p:cNvPr id="157" name="Isosceles Triangle 156"/>
+          <p:cNvPr id="136" name="TextBox 135"/>
+          <p:cNvSpPr txBox="1"/>
+          <p:nvPr/>
+        </p:nvSpPr>
+        <p:spPr>
+          <a:xfrm>
+            <a:off x="5436692" y="3378761"/>
+            <a:ext cx="482824" cy="215444"/>
+          </a:xfrm>
+          <a:prstGeom prst="rect">
+            <a:avLst/>
+          </a:prstGeom>
+          <a:noFill/>
+        </p:spPr>
+        <p:txBody>
+          <a:bodyPr wrap="none" rtlCol="0">
+            <a:spAutoFit/>
+          </a:bodyPr>
+          <a:lstStyle/>
+          <a:p>
+            <a:r>
+              <a:rPr lang="en-US" sz="800" dirty="0"/>
+              <a:t>Output</a:t>
+            </a:r>
+            <a:endParaRPr lang="en-SG" sz="800" dirty="0"/>
+          </a:p>
+        </p:txBody>
+      </p:sp>
+      <p:sp>
+        <p:nvSpPr>
+          <p:cNvPr id="138" name="TextBox 137"/>
+          <p:cNvSpPr txBox="1"/>
+          <p:nvPr/>
+        </p:nvSpPr>
+        <p:spPr>
+          <a:xfrm>
+            <a:off x="5431389" y="4039434"/>
+            <a:ext cx="716863" cy="215444"/>
+          </a:xfrm>
+          <a:prstGeom prst="rect">
+            <a:avLst/>
+          </a:prstGeom>
+          <a:noFill/>
+        </p:spPr>
+        <p:txBody>
+          <a:bodyPr wrap="none" rtlCol="0">
+            <a:spAutoFit/>
+          </a:bodyPr>
+          <a:lstStyle/>
+          <a:p>
+            <a:r>
+              <a:rPr lang="en-US" sz="800" dirty="0"/>
+              <a:t>Not Selected</a:t>
+            </a:r>
+            <a:endParaRPr lang="en-SG" sz="800" dirty="0"/>
+          </a:p>
+        </p:txBody>
+      </p:sp>
+      <p:sp>
+        <p:nvSpPr>
+          <p:cNvPr id="139" name="Rectangle 138"/>
           <p:cNvSpPr/>
           <p:nvPr/>
         </p:nvSpPr>
         <p:spPr>
+          <a:xfrm>
+            <a:off x="3887032" y="3578818"/>
+            <a:ext cx="1722405" cy="507831"/>
+          </a:xfrm>
+          <a:prstGeom prst="rect">
+            <a:avLst/>
+          </a:prstGeom>
+        </p:spPr>
+        <p:txBody>
+          <a:bodyPr wrap="square">
+            <a:spAutoFit/>
+          </a:bodyPr>
+          <a:lstStyle/>
+          <a:p>
+            <a:r>
+              <a:rPr lang="en-SG" sz="900" dirty="0"/>
+              <a:t>road category =  C/B &amp;</a:t>
+            </a:r>
+          </a:p>
+          <a:p>
+            <a:r>
+              <a:rPr lang="en-SG" sz="900" dirty="0"/>
+              <a:t>current speed band = 2/3 &amp;</a:t>
+            </a:r>
+          </a:p>
+          <a:p>
+            <a:r>
+              <a:rPr lang="en-SG" sz="900" dirty="0"/>
+              <a:t>Forecast in area =HG/HR/HS/HT </a:t>
+            </a:r>
+          </a:p>
+        </p:txBody>
+      </p:sp>
+      <p:sp>
+        <p:nvSpPr>
+          <p:cNvPr id="140" name="Isosceles Triangle 139"/>
+          <p:cNvSpPr/>
+          <p:nvPr/>
+        </p:nvSpPr>
+        <p:spPr>
           <a:xfrm rot="5400000">
-            <a:off x="8263920" y="4039364"/>
+            <a:off x="3671979" y="3481880"/>
             <a:ext cx="226423" cy="184888"/>
           </a:xfrm>
           <a:prstGeom prst="triangle">
@@ -8402,53 +8595,84 @@
           </a:p>
         </p:txBody>
       </p:sp>
-      <p:sp>
-        <p:nvSpPr>
-          <p:cNvPr id="158" name="TextBox 157"/>
-          <p:cNvSpPr txBox="1"/>
+      <p:cxnSp>
+        <p:nvCxnSpPr>
+          <p:cNvPr id="69" name="Connector: Elbow 68"/>
+          <p:cNvCxnSpPr>
+            <a:stCxn id="55" idx="0"/>
+            <a:endCxn id="140" idx="3"/>
+          </p:cNvCxnSpPr>
           <p:nvPr/>
-        </p:nvSpPr>
-        <p:spPr>
-          <a:xfrm>
-            <a:off x="6697122" y="3961992"/>
-            <a:ext cx="835485" cy="215444"/>
+        </p:nvCxnSpPr>
+        <p:spPr>
+          <a:xfrm>
+            <a:off x="2735503" y="2340026"/>
+            <a:ext cx="957244" cy="1234299"/>
+          </a:xfrm>
+          <a:prstGeom prst="bentConnector3">
+            <a:avLst>
+              <a:gd name="adj1" fmla="val 50000"/>
+            </a:avLst>
+          </a:prstGeom>
+        </p:spPr>
+        <p:style>
+          <a:lnRef idx="1">
+            <a:schemeClr val="accent1"/>
+          </a:lnRef>
+          <a:fillRef idx="0">
+            <a:schemeClr val="accent1"/>
+          </a:fillRef>
+          <a:effectRef idx="0">
+            <a:schemeClr val="accent1"/>
+          </a:effectRef>
+          <a:fontRef idx="minor">
+            <a:schemeClr val="tx1"/>
+          </a:fontRef>
+        </p:style>
+      </p:cxnSp>
+      <p:sp>
+        <p:nvSpPr>
+          <p:cNvPr id="142" name="Rectangle 141"/>
+          <p:cNvSpPr/>
+          <p:nvPr/>
+        </p:nvSpPr>
+        <p:spPr>
+          <a:xfrm>
+            <a:off x="7364142" y="3629931"/>
+            <a:ext cx="1326513" cy="507831"/>
           </a:xfrm>
           <a:prstGeom prst="rect">
             <a:avLst/>
           </a:prstGeom>
-          <a:noFill/>
-        </p:spPr>
-        <p:txBody>
-          <a:bodyPr wrap="none" rtlCol="0">
+        </p:spPr>
+        <p:txBody>
+          <a:bodyPr wrap="square">
             <a:spAutoFit/>
           </a:bodyPr>
           <a:lstStyle/>
           <a:p>
             <a:r>
-              <a:rPr lang="en-US" sz="800" dirty="0"/>
-              <a:t>EPA7: Translate</a:t>
-            </a:r>
-            <a:endParaRPr lang="en-SG" sz="800" dirty="0"/>
-          </a:p>
-        </p:txBody>
-      </p:sp>
-      <p:sp>
-        <p:nvSpPr>
-          <p:cNvPr id="159" name="Isosceles Triangle 158"/>
+              <a:rPr lang="en-SG" sz="900" dirty="0"/>
+              <a:t>message  =  “Heavy Rain expect in” Area.  Drive with caution”</a:t>
+            </a:r>
+          </a:p>
+        </p:txBody>
+      </p:sp>
+      <p:sp>
+        <p:nvSpPr>
+          <p:cNvPr id="143" name="Rectangle: Rounded Corners 142"/>
           <p:cNvSpPr/>
           <p:nvPr/>
         </p:nvSpPr>
         <p:spPr>
-          <a:xfrm rot="5400000">
-            <a:off x="6619050" y="4065491"/>
-            <a:ext cx="226423" cy="184888"/>
-          </a:xfrm>
-          <a:prstGeom prst="triangle">
+          <a:xfrm>
+            <a:off x="7253707" y="3405398"/>
+            <a:ext cx="1632857" cy="885894"/>
+          </a:xfrm>
+          <a:prstGeom prst="roundRect">
             <a:avLst/>
           </a:prstGeom>
-          <a:solidFill>
-            <a:srgbClr val="FFFF00"/>
-          </a:solidFill>
+          <a:noFill/>
         </p:spPr>
         <p:style>
           <a:lnRef idx="2">
@@ -8475,54 +8699,23 @@
           </a:p>
         </p:txBody>
       </p:sp>
-      <p:cxnSp>
-        <p:nvCxnSpPr>
-          <p:cNvPr id="160" name="Straight Connector 159"/>
-          <p:cNvCxnSpPr>
-            <a:stCxn id="151" idx="0"/>
-            <a:endCxn id="159" idx="3"/>
-          </p:cNvCxnSpPr>
-          <p:nvPr/>
-        </p:nvCxnSpPr>
-        <p:spPr>
-          <a:xfrm>
-            <a:off x="4981920" y="4151183"/>
-            <a:ext cx="1657898" cy="6753"/>
-          </a:xfrm>
-          <a:prstGeom prst="line">
-            <a:avLst/>
-          </a:prstGeom>
-        </p:spPr>
-        <p:style>
-          <a:lnRef idx="1">
-            <a:schemeClr val="accent1"/>
-          </a:lnRef>
-          <a:fillRef idx="0">
-            <a:schemeClr val="accent1"/>
-          </a:fillRef>
-          <a:effectRef idx="0">
-            <a:schemeClr val="accent1"/>
-          </a:effectRef>
-          <a:fontRef idx="minor">
-            <a:schemeClr val="tx1"/>
-          </a:fontRef>
-        </p:style>
-      </p:cxnSp>
-      <p:sp>
-        <p:nvSpPr>
-          <p:cNvPr id="161" name="Rectangle: Rounded Corners 160"/>
+      <p:sp>
+        <p:nvSpPr>
+          <p:cNvPr id="144" name="Isosceles Triangle 143"/>
           <p:cNvSpPr/>
           <p:nvPr/>
         </p:nvSpPr>
         <p:spPr>
-          <a:xfrm>
-            <a:off x="248324" y="5457306"/>
-            <a:ext cx="1068920" cy="566057"/>
-          </a:xfrm>
-          <a:prstGeom prst="roundRect">
+          <a:xfrm rot="5400000">
+            <a:off x="8811052" y="3606248"/>
+            <a:ext cx="226423" cy="184888"/>
+          </a:xfrm>
+          <a:prstGeom prst="triangle">
             <a:avLst/>
           </a:prstGeom>
-          <a:noFill/>
+          <a:solidFill>
+            <a:srgbClr val="FFFF00"/>
+          </a:solidFill>
         </p:spPr>
         <p:style>
           <a:lnRef idx="2">
@@ -8551,13 +8744,13 @@
       </p:sp>
       <p:sp>
         <p:nvSpPr>
-          <p:cNvPr id="162" name="Isosceles Triangle 161"/>
+          <p:cNvPr id="148" name="Isosceles Triangle 147"/>
           <p:cNvSpPr/>
           <p:nvPr/>
         </p:nvSpPr>
         <p:spPr>
           <a:xfrm rot="5400000">
-            <a:off x="1204032" y="5647890"/>
+            <a:off x="7175636" y="3508897"/>
             <a:ext cx="226423" cy="184888"/>
           </a:xfrm>
           <a:prstGeom prst="triangle">
@@ -8592,79 +8785,19 @@
           </a:p>
         </p:txBody>
       </p:sp>
-      <p:sp>
-        <p:nvSpPr>
-          <p:cNvPr id="163" name="TextBox 162"/>
-          <p:cNvSpPr txBox="1"/>
-          <p:nvPr/>
-        </p:nvSpPr>
-        <p:spPr>
-          <a:xfrm>
-            <a:off x="248324" y="5457306"/>
-            <a:ext cx="338554" cy="215444"/>
-          </a:xfrm>
-          <a:prstGeom prst="rect">
-            <a:avLst/>
-          </a:prstGeom>
-          <a:noFill/>
-        </p:spPr>
-        <p:txBody>
-          <a:bodyPr wrap="none" rtlCol="0">
-            <a:spAutoFit/>
-          </a:bodyPr>
-          <a:lstStyle/>
-          <a:p>
-            <a:r>
-              <a:rPr lang="en-US" sz="800" dirty="0"/>
-              <a:t>EP3</a:t>
-            </a:r>
-            <a:endParaRPr lang="en-SG" sz="800" dirty="0"/>
-          </a:p>
-        </p:txBody>
-      </p:sp>
-      <p:sp>
-        <p:nvSpPr>
-          <p:cNvPr id="164" name="TextBox 163"/>
-          <p:cNvSpPr txBox="1"/>
-          <p:nvPr/>
-        </p:nvSpPr>
-        <p:spPr>
-          <a:xfrm>
-            <a:off x="274471" y="5627122"/>
-            <a:ext cx="1016625" cy="246221"/>
-          </a:xfrm>
-          <a:prstGeom prst="rect">
-            <a:avLst/>
-          </a:prstGeom>
-          <a:noFill/>
-        </p:spPr>
-        <p:txBody>
-          <a:bodyPr wrap="none" rtlCol="0">
-            <a:spAutoFit/>
-          </a:bodyPr>
-          <a:lstStyle/>
-          <a:p>
-            <a:r>
-              <a:rPr lang="en-US" sz="1000" dirty="0"/>
-              <a:t>Traffic Incidents</a:t>
-            </a:r>
-            <a:endParaRPr lang="en-SG" sz="1000" dirty="0"/>
-          </a:p>
-        </p:txBody>
-      </p:sp>
       <p:cxnSp>
         <p:nvCxnSpPr>
-          <p:cNvPr id="165" name="Straight Connector 164"/>
+          <p:cNvPr id="78" name="Straight Connector 77"/>
           <p:cNvCxnSpPr>
-            <a:stCxn id="162" idx="0"/>
-            <a:endCxn id="168" idx="3"/>
+            <a:stCxn id="134" idx="0"/>
+            <a:endCxn id="148" idx="3"/>
           </p:cNvCxnSpPr>
           <p:nvPr/>
         </p:nvCxnSpPr>
         <p:spPr>
           <a:xfrm>
-            <a:off x="1409688" y="5740335"/>
-            <a:ext cx="1726473" cy="13969"/>
+            <a:off x="5538506" y="3594589"/>
+            <a:ext cx="1657898" cy="6753"/>
           </a:xfrm>
           <a:prstGeom prst="line">
             <a:avLst/>
@@ -8687,14 +8820,14 @@
       </p:cxnSp>
       <p:sp>
         <p:nvSpPr>
-          <p:cNvPr id="166" name="Rectangle: Rounded Corners 165"/>
+          <p:cNvPr id="158" name="Rectangle: Rounded Corners 157"/>
           <p:cNvSpPr/>
           <p:nvPr/>
         </p:nvSpPr>
         <p:spPr>
           <a:xfrm>
-            <a:off x="3212003" y="5528638"/>
-            <a:ext cx="1632857" cy="885894"/>
+            <a:off x="566367" y="5552714"/>
+            <a:ext cx="1068920" cy="566057"/>
           </a:xfrm>
           <a:prstGeom prst="roundRect">
             <a:avLst/>
@@ -8728,43 +8861,13 @@
       </p:sp>
       <p:sp>
         <p:nvSpPr>
-          <p:cNvPr id="167" name="TextBox 166"/>
-          <p:cNvSpPr txBox="1"/>
-          <p:nvPr/>
-        </p:nvSpPr>
-        <p:spPr>
-          <a:xfrm>
-            <a:off x="3260166" y="5574917"/>
-            <a:ext cx="662361" cy="215444"/>
-          </a:xfrm>
-          <a:prstGeom prst="rect">
-            <a:avLst/>
-          </a:prstGeom>
-          <a:noFill/>
-        </p:spPr>
-        <p:txBody>
-          <a:bodyPr wrap="none" rtlCol="0">
-            <a:spAutoFit/>
-          </a:bodyPr>
-          <a:lstStyle/>
-          <a:p>
-            <a:r>
-              <a:rPr lang="en-US" sz="800" dirty="0"/>
-              <a:t>EPA4: Filter</a:t>
-            </a:r>
-            <a:endParaRPr lang="en-SG" sz="800" dirty="0"/>
-          </a:p>
-        </p:txBody>
-      </p:sp>
-      <p:sp>
-        <p:nvSpPr>
-          <p:cNvPr id="168" name="Isosceles Triangle 167"/>
+          <p:cNvPr id="160" name="Isosceles Triangle 159"/>
           <p:cNvSpPr/>
           <p:nvPr/>
         </p:nvSpPr>
         <p:spPr>
           <a:xfrm rot="5400000">
-            <a:off x="3115393" y="5661859"/>
+            <a:off x="1522075" y="5743298"/>
             <a:ext cx="226423" cy="184888"/>
           </a:xfrm>
           <a:prstGeom prst="triangle">
@@ -8801,21 +8904,112 @@
       </p:sp>
       <p:sp>
         <p:nvSpPr>
-          <p:cNvPr id="169" name="Isosceles Triangle 168"/>
+          <p:cNvPr id="161" name="TextBox 160"/>
+          <p:cNvSpPr txBox="1"/>
+          <p:nvPr/>
+        </p:nvSpPr>
+        <p:spPr>
+          <a:xfrm>
+            <a:off x="566367" y="5552714"/>
+            <a:ext cx="338554" cy="215444"/>
+          </a:xfrm>
+          <a:prstGeom prst="rect">
+            <a:avLst/>
+          </a:prstGeom>
+          <a:noFill/>
+        </p:spPr>
+        <p:txBody>
+          <a:bodyPr wrap="none" rtlCol="0">
+            <a:spAutoFit/>
+          </a:bodyPr>
+          <a:lstStyle/>
+          <a:p>
+            <a:r>
+              <a:rPr lang="en-US" sz="800" dirty="0"/>
+              <a:t>EP3</a:t>
+            </a:r>
+            <a:endParaRPr lang="en-SG" sz="800" dirty="0"/>
+          </a:p>
+        </p:txBody>
+      </p:sp>
+      <p:sp>
+        <p:nvSpPr>
+          <p:cNvPr id="162" name="TextBox 161"/>
+          <p:cNvSpPr txBox="1"/>
+          <p:nvPr/>
+        </p:nvSpPr>
+        <p:spPr>
+          <a:xfrm>
+            <a:off x="592514" y="5722530"/>
+            <a:ext cx="1016625" cy="246221"/>
+          </a:xfrm>
+          <a:prstGeom prst="rect">
+            <a:avLst/>
+          </a:prstGeom>
+          <a:noFill/>
+        </p:spPr>
+        <p:txBody>
+          <a:bodyPr wrap="none" rtlCol="0">
+            <a:spAutoFit/>
+          </a:bodyPr>
+          <a:lstStyle/>
+          <a:p>
+            <a:r>
+              <a:rPr lang="en-US" sz="1000" dirty="0"/>
+              <a:t>Traffic Incidents</a:t>
+            </a:r>
+            <a:endParaRPr lang="en-SG" sz="1000" dirty="0"/>
+          </a:p>
+        </p:txBody>
+      </p:sp>
+      <p:cxnSp>
+        <p:nvCxnSpPr>
+          <p:cNvPr id="168" name="Straight Connector 167"/>
+          <p:cNvCxnSpPr>
+            <a:stCxn id="160" idx="0"/>
+            <a:endCxn id="180" idx="3"/>
+          </p:cNvCxnSpPr>
+          <p:nvPr/>
+        </p:nvCxnSpPr>
+        <p:spPr>
+          <a:xfrm>
+            <a:off x="1727731" y="5835743"/>
+            <a:ext cx="1965016" cy="13969"/>
+          </a:xfrm>
+          <a:prstGeom prst="line">
+            <a:avLst/>
+          </a:prstGeom>
+        </p:spPr>
+        <p:style>
+          <a:lnRef idx="1">
+            <a:schemeClr val="accent1"/>
+          </a:lnRef>
+          <a:fillRef idx="0">
+            <a:schemeClr val="accent1"/>
+          </a:fillRef>
+          <a:effectRef idx="0">
+            <a:schemeClr val="accent1"/>
+          </a:effectRef>
+          <a:fontRef idx="minor">
+            <a:schemeClr val="tx1"/>
+          </a:fontRef>
+        </p:style>
+      </p:cxnSp>
+      <p:sp>
+        <p:nvSpPr>
+          <p:cNvPr id="169" name="Rectangle: Rounded Corners 168"/>
           <p:cNvSpPr/>
           <p:nvPr/>
         </p:nvSpPr>
         <p:spPr>
-          <a:xfrm rot="5400000">
-            <a:off x="4761591" y="5584706"/>
-            <a:ext cx="226423" cy="184888"/>
-          </a:xfrm>
-          <a:prstGeom prst="triangle">
+          <a:xfrm>
+            <a:off x="3768589" y="5624046"/>
+            <a:ext cx="1632857" cy="885894"/>
+          </a:xfrm>
+          <a:prstGeom prst="roundRect">
             <a:avLst/>
           </a:prstGeom>
-          <a:solidFill>
-            <a:srgbClr val="FFFF00"/>
-          </a:solidFill>
+          <a:noFill/>
         </p:spPr>
         <p:style>
           <a:lnRef idx="2">
@@ -8844,47 +9038,51 @@
       </p:sp>
       <p:sp>
         <p:nvSpPr>
-          <p:cNvPr id="170" name="Rectangle 169"/>
+          <p:cNvPr id="173" name="TextBox 172"/>
+          <p:cNvSpPr txBox="1"/>
+          <p:nvPr/>
+        </p:nvSpPr>
+        <p:spPr>
+          <a:xfrm>
+            <a:off x="3816752" y="5670325"/>
+            <a:ext cx="662361" cy="215444"/>
+          </a:xfrm>
+          <a:prstGeom prst="rect">
+            <a:avLst/>
+          </a:prstGeom>
+          <a:noFill/>
+        </p:spPr>
+        <p:txBody>
+          <a:bodyPr wrap="none" rtlCol="0">
+            <a:spAutoFit/>
+          </a:bodyPr>
+          <a:lstStyle/>
+          <a:p>
+            <a:r>
+              <a:rPr lang="en-US" sz="800" dirty="0"/>
+              <a:t>EPA4: Filter</a:t>
+            </a:r>
+            <a:endParaRPr lang="en-SG" sz="800" dirty="0"/>
+          </a:p>
+        </p:txBody>
+      </p:sp>
+      <p:sp>
+        <p:nvSpPr>
+          <p:cNvPr id="174" name="Isosceles Triangle 173"/>
           <p:cNvSpPr/>
           <p:nvPr/>
         </p:nvSpPr>
         <p:spPr>
-          <a:xfrm>
-            <a:off x="6793782" y="5725061"/>
-            <a:ext cx="1326513" cy="507831"/>
-          </a:xfrm>
-          <a:prstGeom prst="rect">
+          <a:xfrm rot="5400000">
+            <a:off x="3689282" y="6158698"/>
+            <a:ext cx="226423" cy="184888"/>
+          </a:xfrm>
+          <a:prstGeom prst="triangle">
             <a:avLst/>
           </a:prstGeom>
-        </p:spPr>
-        <p:txBody>
-          <a:bodyPr wrap="square">
-            <a:spAutoFit/>
-          </a:bodyPr>
-          <a:lstStyle/>
-          <a:p>
-            <a:r>
-              <a:rPr lang="en-SG" sz="900" dirty="0"/>
-              <a:t>message  =  “Heavy Rain expect in” Area.  Drive with caution”</a:t>
-            </a:r>
-          </a:p>
-        </p:txBody>
-      </p:sp>
-      <p:sp>
-        <p:nvSpPr>
-          <p:cNvPr id="171" name="Rectangle: Rounded Corners 170"/>
-          <p:cNvSpPr/>
-          <p:nvPr/>
-        </p:nvSpPr>
-        <p:spPr>
-          <a:xfrm>
-            <a:off x="6683347" y="5500528"/>
-            <a:ext cx="1632857" cy="885894"/>
-          </a:xfrm>
-          <a:prstGeom prst="roundRect">
-            <a:avLst/>
-          </a:prstGeom>
-          <a:noFill/>
+          <a:solidFill>
+            <a:srgbClr val="FFFF00"/>
+          </a:solidFill>
         </p:spPr>
         <p:style>
           <a:lnRef idx="2">
@@ -8913,13 +9111,13 @@
       </p:sp>
       <p:sp>
         <p:nvSpPr>
-          <p:cNvPr id="172" name="Isosceles Triangle 171"/>
+          <p:cNvPr id="180" name="Isosceles Triangle 179"/>
           <p:cNvSpPr/>
           <p:nvPr/>
         </p:nvSpPr>
         <p:spPr>
           <a:xfrm rot="5400000">
-            <a:off x="8250146" y="5577900"/>
+            <a:off x="3671979" y="5757267"/>
             <a:ext cx="226423" cy="184888"/>
           </a:xfrm>
           <a:prstGeom prst="triangle">
@@ -8956,43 +9154,13 @@
       </p:sp>
       <p:sp>
         <p:nvSpPr>
-          <p:cNvPr id="173" name="TextBox 172"/>
-          <p:cNvSpPr txBox="1"/>
-          <p:nvPr/>
-        </p:nvSpPr>
-        <p:spPr>
-          <a:xfrm>
-            <a:off x="6683348" y="5500528"/>
-            <a:ext cx="835485" cy="215444"/>
-          </a:xfrm>
-          <a:prstGeom prst="rect">
-            <a:avLst/>
-          </a:prstGeom>
-          <a:noFill/>
-        </p:spPr>
-        <p:txBody>
-          <a:bodyPr wrap="none" rtlCol="0">
-            <a:spAutoFit/>
-          </a:bodyPr>
-          <a:lstStyle/>
-          <a:p>
-            <a:r>
-              <a:rPr lang="en-US" sz="800" dirty="0"/>
-              <a:t>EPA8: Translate</a:t>
-            </a:r>
-            <a:endParaRPr lang="en-SG" sz="800" dirty="0"/>
-          </a:p>
-        </p:txBody>
-      </p:sp>
-      <p:sp>
-        <p:nvSpPr>
-          <p:cNvPr id="174" name="Isosceles Triangle 173"/>
+          <p:cNvPr id="181" name="Isosceles Triangle 180"/>
           <p:cNvSpPr/>
           <p:nvPr/>
         </p:nvSpPr>
         <p:spPr>
           <a:xfrm rot="5400000">
-            <a:off x="6605276" y="5604027"/>
+            <a:off x="5318177" y="5680114"/>
             <a:ext cx="226423" cy="184888"/>
           </a:xfrm>
           <a:prstGeom prst="triangle">
@@ -9029,80 +9197,21 @@
       </p:sp>
       <p:sp>
         <p:nvSpPr>
-          <p:cNvPr id="175" name="Rectangle 174"/>
+          <p:cNvPr id="182" name="Isosceles Triangle 181"/>
           <p:cNvSpPr/>
           <p:nvPr/>
         </p:nvSpPr>
         <p:spPr>
-          <a:xfrm>
-            <a:off x="3307120" y="5820010"/>
-            <a:ext cx="1722405" cy="369332"/>
-          </a:xfrm>
-          <a:prstGeom prst="rect">
+          <a:xfrm rot="5400000">
+            <a:off x="5329534" y="6016905"/>
+            <a:ext cx="226423" cy="184888"/>
+          </a:xfrm>
+          <a:prstGeom prst="triangle">
             <a:avLst/>
           </a:prstGeom>
-        </p:spPr>
-        <p:txBody>
-          <a:bodyPr wrap="square">
-            <a:spAutoFit/>
-          </a:bodyPr>
-          <a:lstStyle/>
-          <a:p>
-            <a:r>
-              <a:rPr lang="en-SG" sz="900" dirty="0"/>
-              <a:t>Type = accident/vehicle breakdown/unattended vehicle</a:t>
-            </a:r>
-          </a:p>
-        </p:txBody>
-      </p:sp>
-      <p:cxnSp>
-        <p:nvCxnSpPr>
-          <p:cNvPr id="176" name="Straight Connector 175"/>
-          <p:cNvCxnSpPr>
-            <a:stCxn id="169" idx="0"/>
-            <a:endCxn id="174" idx="3"/>
-          </p:cNvCxnSpPr>
-          <p:nvPr/>
-        </p:nvCxnSpPr>
-        <p:spPr>
-          <a:xfrm>
-            <a:off x="4967247" y="5677151"/>
-            <a:ext cx="1658797" cy="19321"/>
-          </a:xfrm>
-          <a:prstGeom prst="line">
-            <a:avLst/>
-          </a:prstGeom>
-        </p:spPr>
-        <p:style>
-          <a:lnRef idx="1">
-            <a:schemeClr val="accent1"/>
-          </a:lnRef>
-          <a:fillRef idx="0">
-            <a:schemeClr val="accent1"/>
-          </a:fillRef>
-          <a:effectRef idx="0">
-            <a:schemeClr val="accent1"/>
-          </a:effectRef>
-          <a:fontRef idx="minor">
-            <a:schemeClr val="tx1"/>
-          </a:fontRef>
-        </p:style>
-      </p:cxnSp>
-      <p:sp>
-        <p:nvSpPr>
-          <p:cNvPr id="177" name="Cylinder 176"/>
-          <p:cNvSpPr/>
-          <p:nvPr/>
-        </p:nvSpPr>
-        <p:spPr>
-          <a:xfrm>
-            <a:off x="5649602" y="4506994"/>
-            <a:ext cx="615863" cy="804643"/>
-          </a:xfrm>
-          <a:prstGeom prst="can">
-            <a:avLst/>
-          </a:prstGeom>
-          <a:noFill/>
+          <a:solidFill>
+            <a:srgbClr val="FFFF00"/>
+          </a:solidFill>
         </p:spPr>
         <p:style>
           <a:lnRef idx="2">
@@ -9131,14 +9240,57 @@
       </p:sp>
       <p:sp>
         <p:nvSpPr>
-          <p:cNvPr id="178" name="TextBox 177"/>
+          <p:cNvPr id="183" name="Isosceles Triangle 182"/>
+          <p:cNvSpPr/>
+          <p:nvPr/>
+        </p:nvSpPr>
+        <p:spPr>
+          <a:xfrm rot="5400000">
+            <a:off x="5318177" y="6336139"/>
+            <a:ext cx="226423" cy="184888"/>
+          </a:xfrm>
+          <a:prstGeom prst="triangle">
+            <a:avLst/>
+          </a:prstGeom>
+          <a:solidFill>
+            <a:srgbClr val="FFFF00"/>
+          </a:solidFill>
+        </p:spPr>
+        <p:style>
+          <a:lnRef idx="2">
+            <a:schemeClr val="accent1">
+              <a:shade val="50000"/>
+            </a:schemeClr>
+          </a:lnRef>
+          <a:fillRef idx="1">
+            <a:schemeClr val="accent1"/>
+          </a:fillRef>
+          <a:effectRef idx="0">
+            <a:schemeClr val="accent1"/>
+          </a:effectRef>
+          <a:fontRef idx="minor">
+            <a:schemeClr val="lt1"/>
+          </a:fontRef>
+        </p:style>
+        <p:txBody>
+          <a:bodyPr rtlCol="0" anchor="ctr"/>
+          <a:lstStyle/>
+          <a:p>
+            <a:pPr algn="ctr"/>
+            <a:endParaRPr lang="en-SG"/>
+          </a:p>
+        </p:txBody>
+      </p:sp>
+      <p:sp>
+        <p:nvSpPr>
+          <p:cNvPr id="184" name="TextBox 183"/>
           <p:cNvSpPr txBox="1"/>
           <p:nvPr/>
         </p:nvSpPr>
         <p:spPr>
           <a:xfrm>
-            <a:off x="5635164" y="4721237"/>
-            <a:ext cx="630301" cy="461665"/>
+            <a:off x="5427073" y="5520866"/>
+            <a:ext cx="502061" cy="215444"/>
           </a:xfrm>
           <a:prstGeom prst="rect">
             <a:avLst/>
@@ -9153,37 +9305,450 @@
           <a:p>
             <a:r>
               <a:rPr lang="en-US" sz="800" dirty="0"/>
-              <a:t>Singapore</a:t>
-            </a:r>
-          </a:p>
+              <a:t>Filter In</a:t>
+            </a:r>
+            <a:endParaRPr lang="en-SG" sz="800" dirty="0"/>
+          </a:p>
+        </p:txBody>
+      </p:sp>
+      <p:sp>
+        <p:nvSpPr>
+          <p:cNvPr id="185" name="TextBox 184"/>
+          <p:cNvSpPr txBox="1"/>
+          <p:nvPr/>
+        </p:nvSpPr>
+        <p:spPr>
+          <a:xfrm>
+            <a:off x="5432810" y="5903327"/>
+            <a:ext cx="577402" cy="215444"/>
+          </a:xfrm>
+          <a:prstGeom prst="rect">
+            <a:avLst/>
+          </a:prstGeom>
+          <a:noFill/>
+        </p:spPr>
+        <p:txBody>
+          <a:bodyPr wrap="none" rtlCol="0">
+            <a:spAutoFit/>
+          </a:bodyPr>
+          <a:lstStyle/>
           <a:p>
             <a:r>
               <a:rPr lang="en-US" sz="800" dirty="0"/>
-              <a:t>Geospatial</a:t>
-            </a:r>
-          </a:p>
+              <a:t>Filter Out</a:t>
+            </a:r>
+            <a:endParaRPr lang="en-SG" sz="800" dirty="0"/>
+          </a:p>
+        </p:txBody>
+      </p:sp>
+      <p:sp>
+        <p:nvSpPr>
+          <p:cNvPr id="186" name="TextBox 185"/>
+          <p:cNvSpPr txBox="1"/>
+          <p:nvPr/>
+        </p:nvSpPr>
+        <p:spPr>
+          <a:xfrm>
+            <a:off x="5386692" y="6461513"/>
+            <a:ext cx="771365" cy="215444"/>
+          </a:xfrm>
+          <a:prstGeom prst="rect">
+            <a:avLst/>
+          </a:prstGeom>
+          <a:noFill/>
+        </p:spPr>
+        <p:txBody>
+          <a:bodyPr wrap="none" rtlCol="0">
+            <a:spAutoFit/>
+          </a:bodyPr>
+          <a:lstStyle/>
           <a:p>
             <a:r>
               <a:rPr lang="en-US" sz="800" dirty="0"/>
-              <a:t>Database</a:t>
+              <a:t>Non-filterable</a:t>
             </a:r>
             <a:endParaRPr lang="en-SG" sz="800" dirty="0"/>
+          </a:p>
+        </p:txBody>
+      </p:sp>
+      <p:sp>
+        <p:nvSpPr>
+          <p:cNvPr id="187" name="Rectangle 186"/>
+          <p:cNvSpPr/>
+          <p:nvPr/>
+        </p:nvSpPr>
+        <p:spPr>
+          <a:xfrm>
+            <a:off x="7358579" y="5695727"/>
+            <a:ext cx="1326513" cy="646331"/>
+          </a:xfrm>
+          <a:prstGeom prst="rect">
+            <a:avLst/>
+          </a:prstGeom>
+        </p:spPr>
+        <p:txBody>
+          <a:bodyPr wrap="square">
+            <a:spAutoFit/>
+          </a:bodyPr>
+          <a:lstStyle/>
+          <a:p>
+            <a:r>
+              <a:rPr lang="en-SG" sz="900" dirty="0"/>
+              <a:t>message  =  Traffic accident at.</a:t>
+            </a:r>
+          </a:p>
+          <a:p>
+            <a:endParaRPr lang="en-US" sz="900" dirty="0"/>
+          </a:p>
+          <a:p>
+            <a:r>
+              <a:rPr lang="en-US" sz="900" dirty="0"/>
+              <a:t>message = roadworks at</a:t>
+            </a:r>
+            <a:endParaRPr lang="en-SG" sz="900" dirty="0"/>
+          </a:p>
+        </p:txBody>
+      </p:sp>
+      <p:sp>
+        <p:nvSpPr>
+          <p:cNvPr id="188" name="Rectangle: Rounded Corners 187"/>
+          <p:cNvSpPr/>
+          <p:nvPr/>
+        </p:nvSpPr>
+        <p:spPr>
+          <a:xfrm>
+            <a:off x="7239933" y="5595936"/>
+            <a:ext cx="1632857" cy="885894"/>
+          </a:xfrm>
+          <a:prstGeom prst="roundRect">
+            <a:avLst/>
+          </a:prstGeom>
+          <a:noFill/>
+        </p:spPr>
+        <p:style>
+          <a:lnRef idx="2">
+            <a:schemeClr val="accent1">
+              <a:shade val="50000"/>
+            </a:schemeClr>
+          </a:lnRef>
+          <a:fillRef idx="1">
+            <a:schemeClr val="accent1"/>
+          </a:fillRef>
+          <a:effectRef idx="0">
+            <a:schemeClr val="accent1"/>
+          </a:effectRef>
+          <a:fontRef idx="minor">
+            <a:schemeClr val="lt1"/>
+          </a:fontRef>
+        </p:style>
+        <p:txBody>
+          <a:bodyPr rtlCol="0" anchor="ctr"/>
+          <a:lstStyle/>
+          <a:p>
+            <a:pPr algn="ctr"/>
+            <a:endParaRPr lang="en-SG"/>
+          </a:p>
+        </p:txBody>
+      </p:sp>
+      <p:sp>
+        <p:nvSpPr>
+          <p:cNvPr id="189" name="Isosceles Triangle 188"/>
+          <p:cNvSpPr/>
+          <p:nvPr/>
+        </p:nvSpPr>
+        <p:spPr>
+          <a:xfrm rot="5400000">
+            <a:off x="8830656" y="5845881"/>
+            <a:ext cx="226423" cy="184888"/>
+          </a:xfrm>
+          <a:prstGeom prst="triangle">
+            <a:avLst/>
+          </a:prstGeom>
+          <a:solidFill>
+            <a:srgbClr val="FFFF00"/>
+          </a:solidFill>
+        </p:spPr>
+        <p:style>
+          <a:lnRef idx="2">
+            <a:schemeClr val="accent1">
+              <a:shade val="50000"/>
+            </a:schemeClr>
+          </a:lnRef>
+          <a:fillRef idx="1">
+            <a:schemeClr val="accent1"/>
+          </a:fillRef>
+          <a:effectRef idx="0">
+            <a:schemeClr val="accent1"/>
+          </a:effectRef>
+          <a:fontRef idx="minor">
+            <a:schemeClr val="lt1"/>
+          </a:fontRef>
+        </p:style>
+        <p:txBody>
+          <a:bodyPr rtlCol="0" anchor="ctr"/>
+          <a:lstStyle/>
+          <a:p>
+            <a:pPr algn="ctr"/>
+            <a:endParaRPr lang="en-SG"/>
+          </a:p>
+        </p:txBody>
+      </p:sp>
+      <p:sp>
+        <p:nvSpPr>
+          <p:cNvPr id="192" name="Isosceles Triangle 191"/>
+          <p:cNvSpPr/>
+          <p:nvPr/>
+        </p:nvSpPr>
+        <p:spPr>
+          <a:xfrm rot="5400000">
+            <a:off x="7161862" y="5699435"/>
+            <a:ext cx="226423" cy="184888"/>
+          </a:xfrm>
+          <a:prstGeom prst="triangle">
+            <a:avLst/>
+          </a:prstGeom>
+          <a:solidFill>
+            <a:srgbClr val="FFFF00"/>
+          </a:solidFill>
+        </p:spPr>
+        <p:style>
+          <a:lnRef idx="2">
+            <a:schemeClr val="accent1">
+              <a:shade val="50000"/>
+            </a:schemeClr>
+          </a:lnRef>
+          <a:fillRef idx="1">
+            <a:schemeClr val="accent1"/>
+          </a:fillRef>
+          <a:effectRef idx="0">
+            <a:schemeClr val="accent1"/>
+          </a:effectRef>
+          <a:fontRef idx="minor">
+            <a:schemeClr val="lt1"/>
+          </a:fontRef>
+        </p:style>
+        <p:txBody>
+          <a:bodyPr rtlCol="0" anchor="ctr"/>
+          <a:lstStyle/>
+          <a:p>
+            <a:pPr algn="ctr"/>
+            <a:endParaRPr lang="en-SG"/>
+          </a:p>
+        </p:txBody>
+      </p:sp>
+      <p:sp>
+        <p:nvSpPr>
+          <p:cNvPr id="195" name="Rectangle 194"/>
+          <p:cNvSpPr/>
+          <p:nvPr/>
+        </p:nvSpPr>
+        <p:spPr>
+          <a:xfrm>
+            <a:off x="3863706" y="5915418"/>
+            <a:ext cx="1722405" cy="369332"/>
+          </a:xfrm>
+          <a:prstGeom prst="rect">
+            <a:avLst/>
+          </a:prstGeom>
+        </p:spPr>
+        <p:txBody>
+          <a:bodyPr wrap="square">
+            <a:spAutoFit/>
+          </a:bodyPr>
+          <a:lstStyle/>
+          <a:p>
+            <a:r>
+              <a:rPr lang="en-SG" sz="900" dirty="0"/>
+              <a:t>Type = accident/vehicle breakdown/unattended vehicle</a:t>
+            </a:r>
           </a:p>
         </p:txBody>
       </p:sp>
       <p:cxnSp>
         <p:nvCxnSpPr>
-          <p:cNvPr id="179" name="Connector: Elbow 178"/>
+          <p:cNvPr id="88" name="Straight Connector 87"/>
           <p:cNvCxnSpPr>
-            <a:stCxn id="177" idx="0"/>
-            <a:endCxn id="131" idx="1"/>
+            <a:stCxn id="181" idx="0"/>
+            <a:endCxn id="192" idx="3"/>
           </p:cNvCxnSpPr>
           <p:nvPr/>
         </p:nvCxnSpPr>
         <p:spPr>
+          <a:xfrm>
+            <a:off x="5523833" y="5772559"/>
+            <a:ext cx="1658797" cy="19321"/>
+          </a:xfrm>
+          <a:prstGeom prst="line">
+            <a:avLst/>
+          </a:prstGeom>
+        </p:spPr>
+        <p:style>
+          <a:lnRef idx="1">
+            <a:schemeClr val="accent1"/>
+          </a:lnRef>
+          <a:fillRef idx="0">
+            <a:schemeClr val="accent1"/>
+          </a:fillRef>
+          <a:effectRef idx="0">
+            <a:schemeClr val="accent1"/>
+          </a:effectRef>
+          <a:fontRef idx="minor">
+            <a:schemeClr val="tx1"/>
+          </a:fontRef>
+        </p:style>
+      </p:cxnSp>
+      <p:sp>
+        <p:nvSpPr>
+          <p:cNvPr id="90" name="Rectangle 89"/>
+          <p:cNvSpPr/>
+          <p:nvPr/>
+        </p:nvSpPr>
+        <p:spPr>
+          <a:xfrm>
+            <a:off x="1874543" y="5057473"/>
+            <a:ext cx="5893306" cy="461665"/>
+          </a:xfrm>
+          <a:prstGeom prst="rect">
+            <a:avLst/>
+          </a:prstGeom>
+        </p:spPr>
+        <p:txBody>
+          <a:bodyPr wrap="square">
+            <a:spAutoFit/>
+          </a:bodyPr>
+          <a:lstStyle/>
+          <a:p>
+            <a:r>
+              <a:rPr lang="en-SG" sz="1200" dirty="0"/>
+              <a:t>Event Processing Network triggers the necessary assistance needed if there is an accident on the road.</a:t>
+            </a:r>
+          </a:p>
+        </p:txBody>
+      </p:sp>
+      <p:sp>
+        <p:nvSpPr>
+          <p:cNvPr id="99" name="Rectangle 98"/>
+          <p:cNvSpPr/>
+          <p:nvPr/>
+        </p:nvSpPr>
+        <p:spPr>
+          <a:xfrm>
+            <a:off x="1805353" y="437054"/>
+            <a:ext cx="7081212" cy="461665"/>
+          </a:xfrm>
+          <a:prstGeom prst="rect">
+            <a:avLst/>
+          </a:prstGeom>
+        </p:spPr>
+        <p:txBody>
+          <a:bodyPr wrap="square">
+            <a:spAutoFit/>
+          </a:bodyPr>
+          <a:lstStyle/>
+          <a:p>
+            <a:r>
+              <a:rPr lang="en-SG" sz="1200" dirty="0"/>
+              <a:t>Event Processing Network triggers the messages at each of the individual arterial roads so as to improve road conditions at major expressways.</a:t>
+            </a:r>
+          </a:p>
+        </p:txBody>
+      </p:sp>
+      <p:sp>
+        <p:nvSpPr>
+          <p:cNvPr id="110" name="Cylinder 109"/>
+          <p:cNvSpPr/>
+          <p:nvPr/>
+        </p:nvSpPr>
+        <p:spPr>
+          <a:xfrm>
+            <a:off x="6206188" y="4196890"/>
+            <a:ext cx="615863" cy="804643"/>
+          </a:xfrm>
+          <a:prstGeom prst="can">
+            <a:avLst/>
+          </a:prstGeom>
+          <a:noFill/>
+        </p:spPr>
+        <p:style>
+          <a:lnRef idx="2">
+            <a:schemeClr val="accent1">
+              <a:shade val="50000"/>
+            </a:schemeClr>
+          </a:lnRef>
+          <a:fillRef idx="1">
+            <a:schemeClr val="accent1"/>
+          </a:fillRef>
+          <a:effectRef idx="0">
+            <a:schemeClr val="accent1"/>
+          </a:effectRef>
+          <a:fontRef idx="minor">
+            <a:schemeClr val="lt1"/>
+          </a:fontRef>
+        </p:style>
+        <p:txBody>
+          <a:bodyPr rtlCol="0" anchor="ctr"/>
+          <a:lstStyle/>
+          <a:p>
+            <a:pPr algn="ctr"/>
+            <a:endParaRPr lang="en-SG"/>
+          </a:p>
+        </p:txBody>
+      </p:sp>
+      <p:sp>
+        <p:nvSpPr>
+          <p:cNvPr id="111" name="TextBox 110"/>
+          <p:cNvSpPr txBox="1"/>
+          <p:nvPr/>
+        </p:nvSpPr>
+        <p:spPr>
+          <a:xfrm>
+            <a:off x="6191750" y="4379328"/>
+            <a:ext cx="630301" cy="461665"/>
+          </a:xfrm>
+          <a:prstGeom prst="rect">
+            <a:avLst/>
+          </a:prstGeom>
+          <a:noFill/>
+        </p:spPr>
+        <p:txBody>
+          <a:bodyPr wrap="none" rtlCol="0">
+            <a:spAutoFit/>
+          </a:bodyPr>
+          <a:lstStyle/>
+          <a:p>
+            <a:r>
+              <a:rPr lang="en-US" sz="800" dirty="0"/>
+              <a:t>Singapore</a:t>
+            </a:r>
+          </a:p>
+          <a:p>
+            <a:r>
+              <a:rPr lang="en-US" sz="800" dirty="0"/>
+              <a:t>Geospatial</a:t>
+            </a:r>
+          </a:p>
+          <a:p>
+            <a:r>
+              <a:rPr lang="en-US" sz="800" dirty="0"/>
+              <a:t>Database</a:t>
+            </a:r>
+            <a:endParaRPr lang="en-SG" sz="800" dirty="0"/>
+          </a:p>
+        </p:txBody>
+      </p:sp>
+      <p:cxnSp>
+        <p:nvCxnSpPr>
+          <p:cNvPr id="16" name="Connector: Elbow 15"/>
+          <p:cNvCxnSpPr>
+            <a:stCxn id="110" idx="0"/>
+            <a:endCxn id="73" idx="1"/>
+          </p:cNvCxnSpPr>
+          <p:nvPr/>
+        </p:nvCxnSpPr>
+        <p:spPr>
           <a:xfrm rot="5400000" flipH="1" flipV="1">
-            <a:off x="5620251" y="3597865"/>
-            <a:ext cx="1400378" cy="725813"/>
+            <a:off x="6041371" y="3152295"/>
+            <a:ext cx="1671310" cy="725813"/>
           </a:xfrm>
           <a:prstGeom prst="bentConnector2">
             <a:avLst/>
@@ -9210,17 +9775,17 @@
       </p:cxnSp>
       <p:cxnSp>
         <p:nvCxnSpPr>
-          <p:cNvPr id="180" name="Connector: Elbow 179"/>
+          <p:cNvPr id="22" name="Connector: Elbow 21"/>
           <p:cNvCxnSpPr>
-            <a:stCxn id="177" idx="0"/>
-            <a:endCxn id="116" idx="1"/>
+            <a:stCxn id="110" idx="0"/>
+            <a:endCxn id="27" idx="1"/>
           </p:cNvCxnSpPr>
           <p:nvPr/>
         </p:nvCxnSpPr>
         <p:spPr>
           <a:xfrm rot="5400000" flipH="1" flipV="1">
-            <a:off x="5032257" y="3031237"/>
-            <a:ext cx="2555001" cy="704447"/>
+            <a:off x="5391855" y="2524145"/>
+            <a:ext cx="2948976" cy="704447"/>
           </a:xfrm>
           <a:prstGeom prst="bentConnector2">
             <a:avLst/>
@@ -9245,10 +9810,230 @@
           </a:fontRef>
         </p:style>
       </p:cxnSp>
+      <p:sp>
+        <p:nvSpPr>
+          <p:cNvPr id="115" name="Rectangle: Rounded Corners 6"/>
+          <p:cNvSpPr/>
+          <p:nvPr/>
+        </p:nvSpPr>
+        <p:spPr>
+          <a:xfrm>
+            <a:off x="589965" y="1085849"/>
+            <a:ext cx="1068920" cy="566057"/>
+          </a:xfrm>
+          <a:prstGeom prst="roundRect">
+            <a:avLst/>
+          </a:prstGeom>
+          <a:noFill/>
+        </p:spPr>
+        <p:style>
+          <a:lnRef idx="2">
+            <a:schemeClr val="accent1">
+              <a:shade val="50000"/>
+            </a:schemeClr>
+          </a:lnRef>
+          <a:fillRef idx="1">
+            <a:schemeClr val="accent1"/>
+          </a:fillRef>
+          <a:effectRef idx="0">
+            <a:schemeClr val="accent1"/>
+          </a:effectRef>
+          <a:fontRef idx="minor">
+            <a:schemeClr val="lt1"/>
+          </a:fontRef>
+        </p:style>
+        <p:txBody>
+          <a:bodyPr rtlCol="0" anchor="ctr"/>
+          <a:lstStyle/>
+          <a:p>
+            <a:pPr algn="ctr"/>
+            <a:endParaRPr lang="en-SG"/>
+          </a:p>
+        </p:txBody>
+      </p:sp>
+      <p:sp>
+        <p:nvSpPr>
+          <p:cNvPr id="117" name="Isosceles Triangle 116"/>
+          <p:cNvSpPr/>
+          <p:nvPr/>
+        </p:nvSpPr>
+        <p:spPr>
+          <a:xfrm rot="5400000">
+            <a:off x="1610772" y="1164654"/>
+            <a:ext cx="226423" cy="184888"/>
+          </a:xfrm>
+          <a:prstGeom prst="triangle">
+            <a:avLst/>
+          </a:prstGeom>
+          <a:solidFill>
+            <a:srgbClr val="FFFF00"/>
+          </a:solidFill>
+        </p:spPr>
+        <p:style>
+          <a:lnRef idx="2">
+            <a:schemeClr val="accent1">
+              <a:shade val="50000"/>
+            </a:schemeClr>
+          </a:lnRef>
+          <a:fillRef idx="1">
+            <a:schemeClr val="accent1"/>
+          </a:fillRef>
+          <a:effectRef idx="0">
+            <a:schemeClr val="accent1"/>
+          </a:effectRef>
+          <a:fontRef idx="minor">
+            <a:schemeClr val="lt1"/>
+          </a:fontRef>
+        </p:style>
+        <p:txBody>
+          <a:bodyPr rtlCol="0" anchor="ctr"/>
+          <a:lstStyle/>
+          <a:p>
+            <a:pPr algn="ctr"/>
+            <a:endParaRPr lang="en-SG"/>
+          </a:p>
+        </p:txBody>
+      </p:sp>
+      <p:cxnSp>
+        <p:nvCxnSpPr>
+          <p:cNvPr id="119" name="Straight Connector 118"/>
+          <p:cNvCxnSpPr>
+            <a:stCxn id="117" idx="0"/>
+            <a:endCxn id="121" idx="3"/>
+          </p:cNvCxnSpPr>
+          <p:nvPr/>
+        </p:nvCxnSpPr>
+        <p:spPr>
+          <a:xfrm>
+            <a:off x="1816428" y="1257099"/>
+            <a:ext cx="1882795" cy="34388"/>
+          </a:xfrm>
+          <a:prstGeom prst="line">
+            <a:avLst/>
+          </a:prstGeom>
+        </p:spPr>
+        <p:style>
+          <a:lnRef idx="1">
+            <a:schemeClr val="accent1"/>
+          </a:lnRef>
+          <a:fillRef idx="0">
+            <a:schemeClr val="accent1"/>
+          </a:fillRef>
+          <a:effectRef idx="0">
+            <a:schemeClr val="accent1"/>
+          </a:effectRef>
+          <a:fontRef idx="minor">
+            <a:schemeClr val="tx1"/>
+          </a:fontRef>
+        </p:style>
+      </p:cxnSp>
+      <p:sp>
+        <p:nvSpPr>
+          <p:cNvPr id="121" name="Isosceles Triangle 120"/>
+          <p:cNvSpPr/>
+          <p:nvPr/>
+        </p:nvSpPr>
+        <p:spPr>
+          <a:xfrm rot="5400000">
+            <a:off x="3678455" y="1199042"/>
+            <a:ext cx="226423" cy="184888"/>
+          </a:xfrm>
+          <a:prstGeom prst="triangle">
+            <a:avLst/>
+          </a:prstGeom>
+          <a:solidFill>
+            <a:srgbClr val="FFFF00"/>
+          </a:solidFill>
+        </p:spPr>
+        <p:style>
+          <a:lnRef idx="2">
+            <a:schemeClr val="accent1">
+              <a:shade val="50000"/>
+            </a:schemeClr>
+          </a:lnRef>
+          <a:fillRef idx="1">
+            <a:schemeClr val="accent1"/>
+          </a:fillRef>
+          <a:effectRef idx="0">
+            <a:schemeClr val="accent1"/>
+          </a:effectRef>
+          <a:fontRef idx="minor">
+            <a:schemeClr val="lt1"/>
+          </a:fontRef>
+        </p:style>
+        <p:txBody>
+          <a:bodyPr rtlCol="0" anchor="ctr"/>
+          <a:lstStyle/>
+          <a:p>
+            <a:pPr algn="ctr"/>
+            <a:endParaRPr lang="en-SG"/>
+          </a:p>
+        </p:txBody>
+      </p:sp>
+      <p:sp>
+        <p:nvSpPr>
+          <p:cNvPr id="122" name="TextBox 121"/>
+          <p:cNvSpPr txBox="1"/>
+          <p:nvPr/>
+        </p:nvSpPr>
+        <p:spPr>
+          <a:xfrm>
+            <a:off x="601335" y="1087283"/>
+            <a:ext cx="338554" cy="215444"/>
+          </a:xfrm>
+          <a:prstGeom prst="rect">
+            <a:avLst/>
+          </a:prstGeom>
+          <a:noFill/>
+        </p:spPr>
+        <p:txBody>
+          <a:bodyPr wrap="none" rtlCol="0">
+            <a:spAutoFit/>
+          </a:bodyPr>
+          <a:lstStyle/>
+          <a:p>
+            <a:r>
+              <a:rPr lang="en-US" sz="800" dirty="0"/>
+              <a:t>EP1</a:t>
+            </a:r>
+            <a:endParaRPr lang="en-SG" sz="800" dirty="0"/>
+          </a:p>
+        </p:txBody>
+      </p:sp>
+      <p:sp>
+        <p:nvSpPr>
+          <p:cNvPr id="123" name="TextBox 122"/>
+          <p:cNvSpPr txBox="1"/>
+          <p:nvPr/>
+        </p:nvSpPr>
+        <p:spPr>
+          <a:xfrm>
+            <a:off x="627482" y="1257099"/>
+            <a:ext cx="950327" cy="400110"/>
+          </a:xfrm>
+          <a:prstGeom prst="rect">
+            <a:avLst/>
+          </a:prstGeom>
+          <a:noFill/>
+        </p:spPr>
+        <p:txBody>
+          <a:bodyPr wrap="square" rtlCol="0">
+            <a:spAutoFit/>
+          </a:bodyPr>
+          <a:lstStyle/>
+          <a:p>
+            <a:r>
+              <a:rPr lang="en-US" sz="1000" dirty="0"/>
+              <a:t>Estimated Travel Time</a:t>
+            </a:r>
+            <a:endParaRPr lang="en-SG" sz="1000" dirty="0"/>
+          </a:p>
+        </p:txBody>
+      </p:sp>
     </p:spTree>
     <p:extLst>
       <p:ext uri="{BB962C8B-B14F-4D97-AF65-F5344CB8AC3E}">
-        <p14:creationId xmlns:p14="http://schemas.microsoft.com/office/powerpoint/2010/main" val="2596329936"/>
+        <p14:creationId xmlns:p14="http://schemas.microsoft.com/office/powerpoint/2010/main" val="2197370676"/>
       </p:ext>
     </p:extLst>
   </p:cSld>
@@ -9472,11 +10257,7 @@
                     <a:p>
                       <a:r>
                         <a:rPr lang="en-US" dirty="0"/>
-                        <a:t>Event </a:t>
-                      </a:r>
-                      <a:r>
-                        <a:rPr lang="en-US" dirty="0"/>
-                        <a:t>Consumer</a:t>
+                        <a:t>Event Consumer</a:t>
                       </a:r>
                       <a:r>
                         <a:rPr lang="en-US" baseline="0" dirty="0"/>

</xml_diff>